<commit_message>
Minor corrections to spelling some embolding and changed results chart to align with paper Altered random forest/decision tree section to close align
</commit_message>
<xml_diff>
--- a/Presentation.pptx
+++ b/Presentation.pptx
@@ -1721,8 +1721,20 @@
         <a:lstStyle/>
         <a:p>
           <a:r>
-            <a:rPr lang="en-US"/>
-            <a:t>Linear Regression – to predict and analyze the correlation of 2 features in our dataset</a:t>
+            <a:rPr lang="en-US" b="1" dirty="0">
+              <a:solidFill>
+                <a:schemeClr val="tx1"/>
+              </a:solidFill>
+            </a:rPr>
+            <a:t>Linear Regression </a:t>
+          </a:r>
+          <a:r>
+            <a:rPr lang="en-US" dirty="0">
+              <a:solidFill>
+                <a:schemeClr val="tx1"/>
+              </a:solidFill>
+            </a:rPr>
+            <a:t>– to predict and analyze the correlation of 2 features in our dataset</a:t>
           </a:r>
         </a:p>
       </dgm:t>
@@ -1757,8 +1769,20 @@
         <a:lstStyle/>
         <a:p>
           <a:r>
-            <a:rPr lang="en-US"/>
-            <a:t>K Means – This is an unsupervised learning technique creating clusters of data based on a centroid</a:t>
+            <a:rPr lang="en-US" b="1" dirty="0">
+              <a:solidFill>
+                <a:schemeClr val="tx1"/>
+              </a:solidFill>
+            </a:rPr>
+            <a:t>K Means </a:t>
+          </a:r>
+          <a:r>
+            <a:rPr lang="en-US" dirty="0">
+              <a:solidFill>
+                <a:schemeClr val="tx1"/>
+              </a:solidFill>
+            </a:rPr>
+            <a:t>– This is an unsupervised learning technique creating clusters of data based on a centroid</a:t>
           </a:r>
         </a:p>
       </dgm:t>
@@ -1793,8 +1817,20 @@
         <a:lstStyle/>
         <a:p>
           <a:r>
-            <a:rPr lang="en-US"/>
-            <a:t>KNN – This is a clustering technique which analyzes data nearest to other data to predict a diagnosis</a:t>
+            <a:rPr lang="en-US" b="1" dirty="0">
+              <a:solidFill>
+                <a:schemeClr val="tx1"/>
+              </a:solidFill>
+            </a:rPr>
+            <a:t>KNN </a:t>
+          </a:r>
+          <a:r>
+            <a:rPr lang="en-US" dirty="0">
+              <a:solidFill>
+                <a:schemeClr val="tx1"/>
+              </a:solidFill>
+            </a:rPr>
+            <a:t>– This is a clustering technique which analyzes data nearest to other data to predict a diagnosis</a:t>
           </a:r>
         </a:p>
       </dgm:t>
@@ -1829,8 +1865,20 @@
         <a:lstStyle/>
         <a:p>
           <a:r>
-            <a:rPr lang="en-US"/>
-            <a:t>Naïve Bayes – This is a technique used to predict cancer by taking features  of our dataset and using the same weight for each -&gt; Assumes data has same effect on output hence Naïve </a:t>
+            <a:rPr lang="en-US" b="1" dirty="0">
+              <a:solidFill>
+                <a:schemeClr val="tx1"/>
+              </a:solidFill>
+            </a:rPr>
+            <a:t>Naïve Bayes </a:t>
+          </a:r>
+          <a:r>
+            <a:rPr lang="en-US" dirty="0">
+              <a:solidFill>
+                <a:schemeClr val="tx1"/>
+              </a:solidFill>
+            </a:rPr>
+            <a:t>– This is a technique used to predict cancer by taking features  of our dataset and using the same weight for each -&gt; Assumes data has same effect on output hence Naïve </a:t>
           </a:r>
         </a:p>
       </dgm:t>
@@ -1866,8 +1914,20 @@
         <a:p>
           <a:pPr rtl="0"/>
           <a:r>
-            <a:rPr lang="en-US" dirty="0"/>
-            <a:t>Decision Trees – Which were used to predict diagnosis by making a tree of features in our dataset which will either lead to positive or negative diagnosis based on their values</a:t>
+            <a:rPr lang="en-US" b="1" dirty="0">
+              <a:solidFill>
+                <a:schemeClr val="tx1"/>
+              </a:solidFill>
+            </a:rPr>
+            <a:t>Decision Trees </a:t>
+          </a:r>
+          <a:r>
+            <a:rPr lang="en-US" dirty="0">
+              <a:solidFill>
+                <a:schemeClr val="tx1"/>
+              </a:solidFill>
+            </a:rPr>
+            <a:t>– Which were used to predict diagnosis by making a tree of features in our dataset which will either lead to positive or negative diagnosis based on their values</a:t>
           </a:r>
         </a:p>
       </dgm:t>
@@ -1875,10 +1935,24 @@
     <dgm:pt modelId="{86C623B7-D842-47FD-8F76-518E9E3BB40A}" type="parTrans" cxnId="{6EB732C6-1218-4ADC-B8AB-CFEF31492F6D}">
       <dgm:prSet/>
       <dgm:spPr/>
+      <dgm:t>
+        <a:bodyPr/>
+        <a:lstStyle/>
+        <a:p>
+          <a:endParaRPr lang="en-IE"/>
+        </a:p>
+      </dgm:t>
     </dgm:pt>
     <dgm:pt modelId="{CF0B5211-688B-495E-A025-BB99EB2A56EE}" type="sibTrans" cxnId="{6EB732C6-1218-4ADC-B8AB-CFEF31492F6D}">
       <dgm:prSet/>
       <dgm:spPr/>
+      <dgm:t>
+        <a:bodyPr/>
+        <a:lstStyle/>
+        <a:p>
+          <a:endParaRPr lang="en-IE"/>
+        </a:p>
+      </dgm:t>
     </dgm:pt>
     <dgm:pt modelId="{3CE2968D-F638-4ED1-BD2F-3F01915010E5}">
       <dgm:prSet phldr="0"/>
@@ -1888,8 +1962,20 @@
         <a:lstStyle/>
         <a:p>
           <a:r>
-            <a:rPr lang="en-US" dirty="0"/>
-            <a:t>Random Forest – Creates multiple trees then merges the best models to predict our diagnois</a:t>
+            <a:rPr lang="en-US" b="1" dirty="0">
+              <a:solidFill>
+                <a:schemeClr val="tx1"/>
+              </a:solidFill>
+            </a:rPr>
+            <a:t>Random Forest </a:t>
+          </a:r>
+          <a:r>
+            <a:rPr lang="en-US" dirty="0">
+              <a:solidFill>
+                <a:schemeClr val="tx1"/>
+              </a:solidFill>
+            </a:rPr>
+            <a:t>– Extended the decision trees to help remove the over fitting of the individual decision trees by taking the tallied vote of different data/decision tree configurations</a:t>
           </a:r>
         </a:p>
       </dgm:t>
@@ -1897,10 +1983,24 @@
     <dgm:pt modelId="{559146B3-2E85-4EA9-8F9E-9958F12B8864}" type="parTrans" cxnId="{5AF0956C-AAE6-4F67-BB2D-F0FCC5118B76}">
       <dgm:prSet/>
       <dgm:spPr/>
+      <dgm:t>
+        <a:bodyPr/>
+        <a:lstStyle/>
+        <a:p>
+          <a:endParaRPr lang="en-IE"/>
+        </a:p>
+      </dgm:t>
     </dgm:pt>
     <dgm:pt modelId="{DE945F27-FF11-4ECF-8FEA-6D2F681B1B56}" type="sibTrans" cxnId="{5AF0956C-AAE6-4F67-BB2D-F0FCC5118B76}">
       <dgm:prSet/>
       <dgm:spPr/>
+      <dgm:t>
+        <a:bodyPr/>
+        <a:lstStyle/>
+        <a:p>
+          <a:endParaRPr lang="en-IE"/>
+        </a:p>
+      </dgm:t>
     </dgm:pt>
     <dgm:pt modelId="{C8C83B8B-CA44-4370-881C-76DB3C36AB94}">
       <dgm:prSet phldr="0"/>
@@ -1910,8 +2010,20 @@
         <a:lstStyle/>
         <a:p>
           <a:r>
-            <a:rPr lang="en-US" dirty="0"/>
-            <a:t>PCA (Principle Component Analysis) - unsupervised dimensionality-reduction which reduced features in our dataset by removing similar features which were highly correlated</a:t>
+            <a:rPr lang="en-US" b="1" dirty="0">
+              <a:solidFill>
+                <a:schemeClr val="tx1"/>
+              </a:solidFill>
+            </a:rPr>
+            <a:t>PCA (Principle Component Analysis) </a:t>
+          </a:r>
+          <a:r>
+            <a:rPr lang="en-US" dirty="0">
+              <a:solidFill>
+                <a:schemeClr val="tx1"/>
+              </a:solidFill>
+            </a:rPr>
+            <a:t>- unsupervised dimensionality-reduction which reduced features in our dataset by removing similar features which were highly correlated, while still retaining as much pertinent information as possible.</a:t>
           </a:r>
         </a:p>
       </dgm:t>
@@ -1919,10 +2031,24 @@
     <dgm:pt modelId="{9E58D535-DCEC-42F3-87A0-7CF653F2E0DC}" type="parTrans" cxnId="{AD246D7D-9EB9-48A3-85AC-199254A63E8F}">
       <dgm:prSet/>
       <dgm:spPr/>
+      <dgm:t>
+        <a:bodyPr/>
+        <a:lstStyle/>
+        <a:p>
+          <a:endParaRPr lang="en-IE"/>
+        </a:p>
+      </dgm:t>
     </dgm:pt>
     <dgm:pt modelId="{A9E3CF06-259D-4662-8C41-9FABA81995C5}" type="sibTrans" cxnId="{AD246D7D-9EB9-48A3-85AC-199254A63E8F}">
       <dgm:prSet/>
       <dgm:spPr/>
+      <dgm:t>
+        <a:bodyPr/>
+        <a:lstStyle/>
+        <a:p>
+          <a:endParaRPr lang="en-IE"/>
+        </a:p>
+      </dgm:t>
     </dgm:pt>
     <dgm:pt modelId="{A6161D87-0223-4245-8563-D50154C0189B}" type="pres">
       <dgm:prSet presAssocID="{1C733716-810A-430F-9031-C2DDCD33359A}" presName="linear" presStyleCnt="0">
@@ -2083,8 +2209,36 @@
         <a:lstStyle/>
         <a:p>
           <a:r>
-            <a:rPr lang="en-US"/>
-            <a:t>Linear Regression was used to analyze the strength of the relationship between certain features and our Diagnosis – Also used Cramérs V </a:t>
+            <a:rPr lang="en-US" b="1" dirty="0">
+              <a:solidFill>
+                <a:schemeClr val="tx1"/>
+              </a:solidFill>
+            </a:rPr>
+            <a:t>Linear Regression </a:t>
+          </a:r>
+          <a:r>
+            <a:rPr lang="en-US" dirty="0">
+              <a:solidFill>
+                <a:schemeClr val="tx1"/>
+              </a:solidFill>
+            </a:rPr>
+            <a:t>was used to analyze the strength of the relationship between certain features and our Diagnosis – Also used </a:t>
+          </a:r>
+          <a:r>
+            <a:rPr lang="en-US" dirty="0" err="1">
+              <a:solidFill>
+                <a:schemeClr val="tx1"/>
+              </a:solidFill>
+            </a:rPr>
+            <a:t>Cramérs</a:t>
+          </a:r>
+          <a:r>
+            <a:rPr lang="en-US" dirty="0">
+              <a:solidFill>
+                <a:schemeClr val="tx1"/>
+              </a:solidFill>
+            </a:rPr>
+            <a:t> V </a:t>
           </a:r>
         </a:p>
       </dgm:t>
@@ -2119,7 +2273,11 @@
         <a:lstStyle/>
         <a:p>
           <a:r>
-            <a:rPr lang="en-US"/>
+            <a:rPr lang="en-US" dirty="0">
+              <a:solidFill>
+                <a:schemeClr val="tx1"/>
+              </a:solidFill>
+            </a:rPr>
             <a:t>Had good results we could see which features were positively correlated with a diagnosis value and the strength of this correlation</a:t>
           </a:r>
         </a:p>
@@ -2155,8 +2313,36 @@
         <a:lstStyle/>
         <a:p>
           <a:r>
-            <a:rPr lang="en-US"/>
-            <a:t>K Means – Performed fairly well with 86% accuracy</a:t>
+            <a:rPr lang="en-US" b="1" dirty="0">
+              <a:solidFill>
+                <a:schemeClr val="tx1"/>
+              </a:solidFill>
+            </a:rPr>
+            <a:t>K Means </a:t>
+          </a:r>
+          <a:r>
+            <a:rPr lang="en-US" dirty="0">
+              <a:solidFill>
+                <a:schemeClr val="tx1"/>
+              </a:solidFill>
+            </a:rPr>
+            <a:t>– Performed fairly well with </a:t>
+          </a:r>
+          <a:r>
+            <a:rPr lang="en-US" b="1" dirty="0">
+              <a:solidFill>
+                <a:schemeClr val="tx1"/>
+              </a:solidFill>
+            </a:rPr>
+            <a:t>86% </a:t>
+          </a:r>
+          <a:r>
+            <a:rPr lang="en-US" dirty="0">
+              <a:solidFill>
+                <a:schemeClr val="tx1"/>
+              </a:solidFill>
+            </a:rPr>
+            <a:t>accuracy</a:t>
           </a:r>
         </a:p>
       </dgm:t>
@@ -2191,8 +2377,36 @@
         <a:lstStyle/>
         <a:p>
           <a:r>
-            <a:rPr lang="en-US"/>
-            <a:t>KNN – Performed better than KNN with 91% accuracy</a:t>
+            <a:rPr lang="en-US" b="1" dirty="0">
+              <a:solidFill>
+                <a:schemeClr val="tx1"/>
+              </a:solidFill>
+            </a:rPr>
+            <a:t>KNN </a:t>
+          </a:r>
+          <a:r>
+            <a:rPr lang="en-US" dirty="0">
+              <a:solidFill>
+                <a:schemeClr val="tx1"/>
+              </a:solidFill>
+            </a:rPr>
+            <a:t>– Performed better than KNN with </a:t>
+          </a:r>
+          <a:r>
+            <a:rPr lang="en-US" b="1" dirty="0">
+              <a:solidFill>
+                <a:schemeClr val="tx1"/>
+              </a:solidFill>
+            </a:rPr>
+            <a:t>91% </a:t>
+          </a:r>
+          <a:r>
+            <a:rPr lang="en-US" dirty="0">
+              <a:solidFill>
+                <a:schemeClr val="tx1"/>
+              </a:solidFill>
+            </a:rPr>
+            <a:t>accuracy</a:t>
           </a:r>
         </a:p>
       </dgm:t>
@@ -2227,8 +2441,36 @@
         <a:lstStyle/>
         <a:p>
           <a:r>
-            <a:rPr lang="en-US"/>
-            <a:t>Gaussian Naïve Bayes – without smoothing or scaling had 90% accuracy on testset </a:t>
+            <a:rPr lang="en-US" b="1" dirty="0">
+              <a:solidFill>
+                <a:schemeClr val="tx1"/>
+              </a:solidFill>
+            </a:rPr>
+            <a:t>Gaussian Naïve Bayes </a:t>
+          </a:r>
+          <a:r>
+            <a:rPr lang="en-US" dirty="0">
+              <a:solidFill>
+                <a:schemeClr val="tx1"/>
+              </a:solidFill>
+            </a:rPr>
+            <a:t>– without smoothing or scaling had </a:t>
+          </a:r>
+          <a:r>
+            <a:rPr lang="en-US" b="1" dirty="0">
+              <a:solidFill>
+                <a:schemeClr val="tx1"/>
+              </a:solidFill>
+            </a:rPr>
+            <a:t>90% </a:t>
+          </a:r>
+          <a:r>
+            <a:rPr lang="en-US" dirty="0">
+              <a:solidFill>
+                <a:schemeClr val="tx1"/>
+              </a:solidFill>
+            </a:rPr>
+            <a:t>accuracy on test set </a:t>
           </a:r>
         </a:p>
       </dgm:t>
@@ -2264,8 +2506,36 @@
         <a:p>
           <a:pPr rtl="0"/>
           <a:r>
-            <a:rPr lang="en-US" dirty="0"/>
-            <a:t>Gaussian Naïve Bayes with scaling had around a 91% accuracy rate – not much improvement</a:t>
+            <a:rPr lang="en-US" b="1" dirty="0">
+              <a:solidFill>
+                <a:schemeClr val="tx1"/>
+              </a:solidFill>
+            </a:rPr>
+            <a:t>Gaussian Naïve Bayes </a:t>
+          </a:r>
+          <a:r>
+            <a:rPr lang="en-US" dirty="0">
+              <a:solidFill>
+                <a:schemeClr val="tx1"/>
+              </a:solidFill>
+            </a:rPr>
+            <a:t>with scaling had around a </a:t>
+          </a:r>
+          <a:r>
+            <a:rPr lang="en-US" b="1" dirty="0">
+              <a:solidFill>
+                <a:schemeClr val="tx1"/>
+              </a:solidFill>
+            </a:rPr>
+            <a:t>91% </a:t>
+          </a:r>
+          <a:r>
+            <a:rPr lang="en-US" dirty="0">
+              <a:solidFill>
+                <a:schemeClr val="tx1"/>
+              </a:solidFill>
+            </a:rPr>
+            <a:t>accuracy rate – not much improvement</a:t>
           </a:r>
         </a:p>
       </dgm:t>
@@ -2273,10 +2543,24 @@
     <dgm:pt modelId="{693ADC96-C472-4100-B35E-55680AF2F24F}" type="parTrans" cxnId="{CF17F852-25AC-47E3-BE78-40C970747AF8}">
       <dgm:prSet/>
       <dgm:spPr/>
+      <dgm:t>
+        <a:bodyPr/>
+        <a:lstStyle/>
+        <a:p>
+          <a:endParaRPr lang="en-IE"/>
+        </a:p>
+      </dgm:t>
     </dgm:pt>
     <dgm:pt modelId="{CDF363D5-8BFC-463F-9F06-CCE91EB57989}" type="sibTrans" cxnId="{CF17F852-25AC-47E3-BE78-40C970747AF8}">
       <dgm:prSet/>
       <dgm:spPr/>
+      <dgm:t>
+        <a:bodyPr/>
+        <a:lstStyle/>
+        <a:p>
+          <a:endParaRPr lang="en-IE"/>
+        </a:p>
+      </dgm:t>
     </dgm:pt>
     <dgm:pt modelId="{AD4E01DF-B94F-40BA-A950-CAD0C6BAC213}">
       <dgm:prSet phldr="0"/>
@@ -2286,8 +2570,60 @@
         <a:lstStyle/>
         <a:p>
           <a:r>
-            <a:rPr lang="en-US" dirty="0"/>
-            <a:t>Decision Tree model had an accuracy of 93%</a:t>
+            <a:rPr lang="en-US" dirty="0">
+              <a:solidFill>
+                <a:schemeClr val="tx1"/>
+              </a:solidFill>
+            </a:rPr>
+            <a:t>Most of our </a:t>
+          </a:r>
+          <a:r>
+            <a:rPr lang="en-US" b="1" dirty="0">
+              <a:solidFill>
+                <a:schemeClr val="tx1"/>
+              </a:solidFill>
+            </a:rPr>
+            <a:t>Decision Tree </a:t>
+          </a:r>
+          <a:r>
+            <a:rPr lang="en-US" dirty="0">
+              <a:solidFill>
+                <a:schemeClr val="tx1"/>
+              </a:solidFill>
+            </a:rPr>
+            <a:t>and </a:t>
+          </a:r>
+          <a:r>
+            <a:rPr lang="en-US" b="1" dirty="0">
+              <a:solidFill>
+                <a:schemeClr val="tx1"/>
+              </a:solidFill>
+            </a:rPr>
+            <a:t>Random Forest </a:t>
+          </a:r>
+          <a:r>
+            <a:rPr lang="en-US" dirty="0">
+              <a:solidFill>
+                <a:schemeClr val="tx1"/>
+              </a:solidFill>
+            </a:rPr>
+            <a:t>models had a had high degree of  accuracy. However with our smaller dataset we must consider the possibility of </a:t>
+          </a:r>
+          <a:r>
+            <a:rPr lang="en-US" b="1" dirty="0">
+              <a:solidFill>
+                <a:schemeClr val="tx1"/>
+              </a:solidFill>
+            </a:rPr>
+            <a:t>over fitting</a:t>
+          </a:r>
+          <a:r>
+            <a:rPr lang="en-US" dirty="0">
+              <a:solidFill>
+                <a:schemeClr val="tx1"/>
+              </a:solidFill>
+            </a:rPr>
+            <a:t>.</a:t>
           </a:r>
         </a:p>
       </dgm:t>
@@ -2295,32 +2631,24 @@
     <dgm:pt modelId="{F1750691-D488-485C-84EE-75903342ED3A}" type="parTrans" cxnId="{28B9A3DD-C96C-4231-AA82-7948ECC10E87}">
       <dgm:prSet/>
       <dgm:spPr/>
+      <dgm:t>
+        <a:bodyPr/>
+        <a:lstStyle/>
+        <a:p>
+          <a:endParaRPr lang="en-IE"/>
+        </a:p>
+      </dgm:t>
     </dgm:pt>
     <dgm:pt modelId="{BB3532AF-B99D-44C2-A1C0-5C14E513AE75}" type="sibTrans" cxnId="{28B9A3DD-C96C-4231-AA82-7948ECC10E87}">
       <dgm:prSet/>
-      <dgm:spPr/>
-    </dgm:pt>
-    <dgm:pt modelId="{DE52EBBD-C1E0-478B-BC4B-6BD410BC4878}">
-      <dgm:prSet phldr="0"/>
       <dgm:spPr/>
       <dgm:t>
         <a:bodyPr/>
         <a:lstStyle/>
         <a:p>
-          <a:r>
-            <a:rPr lang="en-US" dirty="0"/>
-            <a:t>Random forest had around the same degree of accuracy</a:t>
-          </a:r>
+          <a:endParaRPr lang="en-IE"/>
         </a:p>
       </dgm:t>
-    </dgm:pt>
-    <dgm:pt modelId="{CE7CB06A-1CBB-466A-AE92-2DEA75E62EEF}" type="parTrans" cxnId="{E491F7AD-AFDA-4D7E-8318-11FB183E748A}">
-      <dgm:prSet/>
-      <dgm:spPr/>
-    </dgm:pt>
-    <dgm:pt modelId="{690E5620-AA24-4C80-8B47-D7C40C422B14}" type="sibTrans" cxnId="{E491F7AD-AFDA-4D7E-8318-11FB183E748A}">
-      <dgm:prSet/>
-      <dgm:spPr/>
     </dgm:pt>
     <dgm:pt modelId="{6ED6DB01-3829-45A0-A608-7DF34AD61DDC}">
       <dgm:prSet phldr="0"/>
@@ -2330,8 +2658,36 @@
         <a:lstStyle/>
         <a:p>
           <a:r>
-            <a:rPr lang="en-US" dirty="0"/>
-            <a:t>Entropy Forest had 90% accuracy</a:t>
+            <a:rPr lang="en-US" b="1" dirty="0">
+              <a:solidFill>
+                <a:schemeClr val="tx1"/>
+              </a:solidFill>
+            </a:rPr>
+            <a:t>Entropy Forest </a:t>
+          </a:r>
+          <a:r>
+            <a:rPr lang="en-US" dirty="0">
+              <a:solidFill>
+                <a:schemeClr val="tx1"/>
+              </a:solidFill>
+            </a:rPr>
+            <a:t>had </a:t>
+          </a:r>
+          <a:r>
+            <a:rPr lang="en-US" b="1" dirty="0">
+              <a:solidFill>
+                <a:schemeClr val="tx1"/>
+              </a:solidFill>
+            </a:rPr>
+            <a:t>90% </a:t>
+          </a:r>
+          <a:r>
+            <a:rPr lang="en-US" dirty="0">
+              <a:solidFill>
+                <a:schemeClr val="tx1"/>
+              </a:solidFill>
+            </a:rPr>
+            <a:t>accuracy</a:t>
           </a:r>
         </a:p>
       </dgm:t>
@@ -2339,10 +2695,24 @@
     <dgm:pt modelId="{D27414C6-8AE2-40C3-8874-D65204A2849B}" type="parTrans" cxnId="{8EE6ED61-BD94-45FD-AA8B-B35DAE78D4D0}">
       <dgm:prSet/>
       <dgm:spPr/>
+      <dgm:t>
+        <a:bodyPr/>
+        <a:lstStyle/>
+        <a:p>
+          <a:endParaRPr lang="en-IE"/>
+        </a:p>
+      </dgm:t>
     </dgm:pt>
     <dgm:pt modelId="{1F33AD0D-6878-47B9-8649-1A5B4EEB2FEE}" type="sibTrans" cxnId="{8EE6ED61-BD94-45FD-AA8B-B35DAE78D4D0}">
       <dgm:prSet/>
       <dgm:spPr/>
+      <dgm:t>
+        <a:bodyPr/>
+        <a:lstStyle/>
+        <a:p>
+          <a:endParaRPr lang="en-IE"/>
+        </a:p>
+      </dgm:t>
     </dgm:pt>
     <dgm:pt modelId="{EB8E0939-6DFD-40B1-BFF3-68B709346EAD}">
       <dgm:prSet phldr="0"/>
@@ -2352,8 +2722,28 @@
         <a:lstStyle/>
         <a:p>
           <a:r>
-            <a:rPr lang="en-US" dirty="0"/>
-            <a:t>PCA Gini Tree had an accuracy of 0.94%</a:t>
+            <a:rPr lang="en-US" b="1" dirty="0">
+              <a:solidFill>
+                <a:schemeClr val="tx1"/>
+              </a:solidFill>
+            </a:rPr>
+            <a:t>PCA Gini Tree </a:t>
+          </a:r>
+          <a:r>
+            <a:rPr lang="en-US" dirty="0">
+              <a:solidFill>
+                <a:schemeClr val="tx1"/>
+              </a:solidFill>
+            </a:rPr>
+            <a:t>had an accuracy of </a:t>
+          </a:r>
+          <a:r>
+            <a:rPr lang="en-US" b="1" dirty="0">
+              <a:solidFill>
+                <a:schemeClr val="tx1"/>
+              </a:solidFill>
+            </a:rPr>
+            <a:t>94%</a:t>
           </a:r>
         </a:p>
       </dgm:t>
@@ -2361,10 +2751,24 @@
     <dgm:pt modelId="{04C42A93-ABE6-4076-9BBA-067045C459E4}" type="parTrans" cxnId="{52E5D04C-7D88-4D38-8633-04E010576728}">
       <dgm:prSet/>
       <dgm:spPr/>
+      <dgm:t>
+        <a:bodyPr/>
+        <a:lstStyle/>
+        <a:p>
+          <a:endParaRPr lang="en-IE"/>
+        </a:p>
+      </dgm:t>
     </dgm:pt>
     <dgm:pt modelId="{6B1B8048-35B4-4914-B9B1-A4AFF2951783}" type="sibTrans" cxnId="{52E5D04C-7D88-4D38-8633-04E010576728}">
       <dgm:prSet/>
       <dgm:spPr/>
+      <dgm:t>
+        <a:bodyPr/>
+        <a:lstStyle/>
+        <a:p>
+          <a:endParaRPr lang="en-IE"/>
+        </a:p>
+      </dgm:t>
     </dgm:pt>
     <dgm:pt modelId="{309A7258-5971-43F6-A8CC-4CCECEA554CA}">
       <dgm:prSet phldr="0"/>
@@ -2374,8 +2778,28 @@
         <a:lstStyle/>
         <a:p>
           <a:r>
-            <a:rPr lang="en-US" dirty="0"/>
-            <a:t>PCA Random forest had the best accuracy of all our models at 97%</a:t>
+            <a:rPr lang="en-US" b="1" dirty="0">
+              <a:solidFill>
+                <a:schemeClr val="tx1"/>
+              </a:solidFill>
+            </a:rPr>
+            <a:t>PCA Random Forest </a:t>
+          </a:r>
+          <a:r>
+            <a:rPr lang="en-US" dirty="0">
+              <a:solidFill>
+                <a:schemeClr val="tx1"/>
+              </a:solidFill>
+            </a:rPr>
+            <a:t>had the best accuracy of all our models at </a:t>
+          </a:r>
+          <a:r>
+            <a:rPr lang="en-US" b="1" dirty="0">
+              <a:solidFill>
+                <a:schemeClr val="tx1"/>
+              </a:solidFill>
+            </a:rPr>
+            <a:t>97%</a:t>
           </a:r>
         </a:p>
       </dgm:t>
@@ -2383,10 +2807,24 @@
     <dgm:pt modelId="{284B1B69-CE74-4C88-91AE-A251EBCA5A9C}" type="parTrans" cxnId="{0CFB1165-DE36-433D-BD44-0B6584ADEA4F}">
       <dgm:prSet/>
       <dgm:spPr/>
+      <dgm:t>
+        <a:bodyPr/>
+        <a:lstStyle/>
+        <a:p>
+          <a:endParaRPr lang="en-IE"/>
+        </a:p>
+      </dgm:t>
     </dgm:pt>
     <dgm:pt modelId="{B70E25C7-8F49-49F3-AC35-12CC7E9F0C5A}" type="sibTrans" cxnId="{0CFB1165-DE36-433D-BD44-0B6584ADEA4F}">
       <dgm:prSet/>
       <dgm:spPr/>
+      <dgm:t>
+        <a:bodyPr/>
+        <a:lstStyle/>
+        <a:p>
+          <a:endParaRPr lang="en-IE"/>
+        </a:p>
+      </dgm:t>
     </dgm:pt>
     <dgm:pt modelId="{EF90A053-B624-4BF4-B5EA-32A076A6E5A4}" type="pres">
       <dgm:prSet presAssocID="{3EE7B83D-68E5-48A7-B3A1-AD827FBD1DF2}" presName="linear" presStyleCnt="0">
@@ -2398,7 +2836,7 @@
       <dgm:spPr/>
     </dgm:pt>
     <dgm:pt modelId="{BE54A4F7-AA56-4D11-93D2-B8F6B566D5EC}" type="pres">
-      <dgm:prSet presAssocID="{E599A7A1-3968-487C-ADA7-6F5FE62B2C1E}" presName="parentText" presStyleLbl="node1" presStyleIdx="0" presStyleCnt="11">
+      <dgm:prSet presAssocID="{E599A7A1-3968-487C-ADA7-6F5FE62B2C1E}" presName="parentText" presStyleLbl="node1" presStyleIdx="0" presStyleCnt="10">
         <dgm:presLayoutVars>
           <dgm:chMax val="0"/>
           <dgm:bulletEnabled val="1"/>
@@ -2411,7 +2849,7 @@
       <dgm:spPr/>
     </dgm:pt>
     <dgm:pt modelId="{FB8BF19F-8B58-4495-8021-F3D36A48E9EA}" type="pres">
-      <dgm:prSet presAssocID="{E914C79A-4343-43A9-830A-30FC54736E69}" presName="parentText" presStyleLbl="node1" presStyleIdx="1" presStyleCnt="11">
+      <dgm:prSet presAssocID="{E914C79A-4343-43A9-830A-30FC54736E69}" presName="parentText" presStyleLbl="node1" presStyleIdx="1" presStyleCnt="10">
         <dgm:presLayoutVars>
           <dgm:chMax val="0"/>
           <dgm:bulletEnabled val="1"/>
@@ -2424,7 +2862,7 @@
       <dgm:spPr/>
     </dgm:pt>
     <dgm:pt modelId="{FACF1003-68A0-45FC-88C4-4EA9960DCD16}" type="pres">
-      <dgm:prSet presAssocID="{5D61A70B-CFB2-4761-A147-7121DF45454D}" presName="parentText" presStyleLbl="node1" presStyleIdx="2" presStyleCnt="11">
+      <dgm:prSet presAssocID="{5D61A70B-CFB2-4761-A147-7121DF45454D}" presName="parentText" presStyleLbl="node1" presStyleIdx="2" presStyleCnt="10">
         <dgm:presLayoutVars>
           <dgm:chMax val="0"/>
           <dgm:bulletEnabled val="1"/>
@@ -2437,7 +2875,7 @@
       <dgm:spPr/>
     </dgm:pt>
     <dgm:pt modelId="{4BF401AB-82EE-4C4A-A9D3-B986883EC6C7}" type="pres">
-      <dgm:prSet presAssocID="{5757C7AE-A2CE-46FB-9F32-57D93D7AA4F4}" presName="parentText" presStyleLbl="node1" presStyleIdx="3" presStyleCnt="11">
+      <dgm:prSet presAssocID="{5757C7AE-A2CE-46FB-9F32-57D93D7AA4F4}" presName="parentText" presStyleLbl="node1" presStyleIdx="3" presStyleCnt="10">
         <dgm:presLayoutVars>
           <dgm:chMax val="0"/>
           <dgm:bulletEnabled val="1"/>
@@ -2450,7 +2888,7 @@
       <dgm:spPr/>
     </dgm:pt>
     <dgm:pt modelId="{ABE95E06-6157-4884-802F-E8DF52085FEA}" type="pres">
-      <dgm:prSet presAssocID="{2F9CFD13-5E09-4066-B45B-5F3A27196AF5}" presName="parentText" presStyleLbl="node1" presStyleIdx="4" presStyleCnt="11">
+      <dgm:prSet presAssocID="{2F9CFD13-5E09-4066-B45B-5F3A27196AF5}" presName="parentText" presStyleLbl="node1" presStyleIdx="4" presStyleCnt="10">
         <dgm:presLayoutVars>
           <dgm:chMax val="0"/>
           <dgm:bulletEnabled val="1"/>
@@ -2463,7 +2901,7 @@
       <dgm:spPr/>
     </dgm:pt>
     <dgm:pt modelId="{E8103F07-51AF-4052-804B-1B6F00D659A1}" type="pres">
-      <dgm:prSet presAssocID="{3E48A420-4406-4D17-B38B-E156B9D35328}" presName="parentText" presStyleLbl="node1" presStyleIdx="5" presStyleCnt="11">
+      <dgm:prSet presAssocID="{3E48A420-4406-4D17-B38B-E156B9D35328}" presName="parentText" presStyleLbl="node1" presStyleIdx="5" presStyleCnt="10">
         <dgm:presLayoutVars>
           <dgm:chMax val="0"/>
           <dgm:bulletEnabled val="1"/>
@@ -2476,7 +2914,7 @@
       <dgm:spPr/>
     </dgm:pt>
     <dgm:pt modelId="{24A5F7E2-0648-4888-AA43-276E1444D225}" type="pres">
-      <dgm:prSet presAssocID="{AD4E01DF-B94F-40BA-A950-CAD0C6BAC213}" presName="parentText" presStyleLbl="node1" presStyleIdx="6" presStyleCnt="11">
+      <dgm:prSet presAssocID="{AD4E01DF-B94F-40BA-A950-CAD0C6BAC213}" presName="parentText" presStyleLbl="node1" presStyleIdx="6" presStyleCnt="10" custLinFactNeighborX="-3562" custLinFactNeighborY="-58795">
         <dgm:presLayoutVars>
           <dgm:chMax val="0"/>
           <dgm:bulletEnabled val="1"/>
@@ -2488,21 +2926,8 @@
       <dgm:prSet presAssocID="{BB3532AF-B99D-44C2-A1C0-5C14E513AE75}" presName="spacer" presStyleCnt="0"/>
       <dgm:spPr/>
     </dgm:pt>
-    <dgm:pt modelId="{C7D27D16-127B-4CFA-B969-EF4D744B0EF5}" type="pres">
-      <dgm:prSet presAssocID="{DE52EBBD-C1E0-478B-BC4B-6BD410BC4878}" presName="parentText" presStyleLbl="node1" presStyleIdx="7" presStyleCnt="11">
-        <dgm:presLayoutVars>
-          <dgm:chMax val="0"/>
-          <dgm:bulletEnabled val="1"/>
-        </dgm:presLayoutVars>
-      </dgm:prSet>
-      <dgm:spPr/>
-    </dgm:pt>
-    <dgm:pt modelId="{EE8CA06F-F12B-46B2-BE44-723858A9E1C0}" type="pres">
-      <dgm:prSet presAssocID="{690E5620-AA24-4C80-8B47-D7C40C422B14}" presName="spacer" presStyleCnt="0"/>
-      <dgm:spPr/>
-    </dgm:pt>
     <dgm:pt modelId="{CA754C5A-7F5F-415B-A46A-DFADE49934B2}" type="pres">
-      <dgm:prSet presAssocID="{6ED6DB01-3829-45A0-A608-7DF34AD61DDC}" presName="parentText" presStyleLbl="node1" presStyleIdx="8" presStyleCnt="11">
+      <dgm:prSet presAssocID="{6ED6DB01-3829-45A0-A608-7DF34AD61DDC}" presName="parentText" presStyleLbl="node1" presStyleIdx="7" presStyleCnt="10">
         <dgm:presLayoutVars>
           <dgm:chMax val="0"/>
           <dgm:bulletEnabled val="1"/>
@@ -2515,7 +2940,7 @@
       <dgm:spPr/>
     </dgm:pt>
     <dgm:pt modelId="{0419303C-207C-4C68-A4A8-99B2954CA40E}" type="pres">
-      <dgm:prSet presAssocID="{EB8E0939-6DFD-40B1-BFF3-68B709346EAD}" presName="parentText" presStyleLbl="node1" presStyleIdx="9" presStyleCnt="11">
+      <dgm:prSet presAssocID="{EB8E0939-6DFD-40B1-BFF3-68B709346EAD}" presName="parentText" presStyleLbl="node1" presStyleIdx="8" presStyleCnt="10">
         <dgm:presLayoutVars>
           <dgm:chMax val="0"/>
           <dgm:bulletEnabled val="1"/>
@@ -2528,7 +2953,7 @@
       <dgm:spPr/>
     </dgm:pt>
     <dgm:pt modelId="{AEDA5246-62EE-469D-BE0C-226089261DA4}" type="pres">
-      <dgm:prSet presAssocID="{309A7258-5971-43F6-A8CC-4CCECEA554CA}" presName="parentText" presStyleLbl="node1" presStyleIdx="10" presStyleCnt="11">
+      <dgm:prSet presAssocID="{309A7258-5971-43F6-A8CC-4CCECEA554CA}" presName="parentText" presStyleLbl="node1" presStyleIdx="9" presStyleCnt="10">
         <dgm:presLayoutVars>
           <dgm:chMax val="0"/>
           <dgm:bulletEnabled val="1"/>
@@ -2543,20 +2968,18 @@
     <dgm:cxn modelId="{2ABF1124-4ACF-42F2-8580-D84E4B45A1B7}" type="presOf" srcId="{E914C79A-4343-43A9-830A-30FC54736E69}" destId="{FB8BF19F-8B58-4495-8021-F3D36A48E9EA}" srcOrd="0" destOrd="0" presId="urn:microsoft.com/office/officeart/2005/8/layout/vList2"/>
     <dgm:cxn modelId="{4A76A226-DD67-45ED-8D59-2DBEF12FF5D1}" type="presOf" srcId="{3EE7B83D-68E5-48A7-B3A1-AD827FBD1DF2}" destId="{EF90A053-B624-4BF4-B5EA-32A076A6E5A4}" srcOrd="0" destOrd="0" presId="urn:microsoft.com/office/officeart/2005/8/layout/vList2"/>
     <dgm:cxn modelId="{350D5D34-2E02-4129-B658-594FD64ABAEA}" type="presOf" srcId="{3E48A420-4406-4D17-B38B-E156B9D35328}" destId="{E8103F07-51AF-4052-804B-1B6F00D659A1}" srcOrd="0" destOrd="0" presId="urn:microsoft.com/office/officeart/2005/8/layout/vList2"/>
-    <dgm:cxn modelId="{E88E5A5E-4F70-4000-A216-7EE92B90D3B5}" type="presOf" srcId="{DE52EBBD-C1E0-478B-BC4B-6BD410BC4878}" destId="{C7D27D16-127B-4CFA-B969-EF4D744B0EF5}" srcOrd="0" destOrd="0" presId="urn:microsoft.com/office/officeart/2005/8/layout/vList2"/>
     <dgm:cxn modelId="{62CB1B60-02AD-4845-9B86-4EA75138A524}" type="presOf" srcId="{6ED6DB01-3829-45A0-A608-7DF34AD61DDC}" destId="{CA754C5A-7F5F-415B-A46A-DFADE49934B2}" srcOrd="0" destOrd="0" presId="urn:microsoft.com/office/officeart/2005/8/layout/vList2"/>
-    <dgm:cxn modelId="{8EE6ED61-BD94-45FD-AA8B-B35DAE78D4D0}" srcId="{3EE7B83D-68E5-48A7-B3A1-AD827FBD1DF2}" destId="{6ED6DB01-3829-45A0-A608-7DF34AD61DDC}" srcOrd="8" destOrd="0" parTransId="{D27414C6-8AE2-40C3-8874-D65204A2849B}" sibTransId="{1F33AD0D-6878-47B9-8649-1A5B4EEB2FEE}"/>
+    <dgm:cxn modelId="{8EE6ED61-BD94-45FD-AA8B-B35DAE78D4D0}" srcId="{3EE7B83D-68E5-48A7-B3A1-AD827FBD1DF2}" destId="{6ED6DB01-3829-45A0-A608-7DF34AD61DDC}" srcOrd="7" destOrd="0" parTransId="{D27414C6-8AE2-40C3-8874-D65204A2849B}" sibTransId="{1F33AD0D-6878-47B9-8649-1A5B4EEB2FEE}"/>
     <dgm:cxn modelId="{238B5643-6365-4E1B-A727-752661504EEC}" type="presOf" srcId="{5D61A70B-CFB2-4761-A147-7121DF45454D}" destId="{FACF1003-68A0-45FC-88C4-4EA9960DCD16}" srcOrd="0" destOrd="0" presId="urn:microsoft.com/office/officeart/2005/8/layout/vList2"/>
-    <dgm:cxn modelId="{0CFB1165-DE36-433D-BD44-0B6584ADEA4F}" srcId="{3EE7B83D-68E5-48A7-B3A1-AD827FBD1DF2}" destId="{309A7258-5971-43F6-A8CC-4CCECEA554CA}" srcOrd="10" destOrd="0" parTransId="{284B1B69-CE74-4C88-91AE-A251EBCA5A9C}" sibTransId="{B70E25C7-8F49-49F3-AC35-12CC7E9F0C5A}"/>
+    <dgm:cxn modelId="{0CFB1165-DE36-433D-BD44-0B6584ADEA4F}" srcId="{3EE7B83D-68E5-48A7-B3A1-AD827FBD1DF2}" destId="{309A7258-5971-43F6-A8CC-4CCECEA554CA}" srcOrd="9" destOrd="0" parTransId="{284B1B69-CE74-4C88-91AE-A251EBCA5A9C}" sibTransId="{B70E25C7-8F49-49F3-AC35-12CC7E9F0C5A}"/>
     <dgm:cxn modelId="{22115F68-ED34-4AE6-8640-F4D450EBE413}" srcId="{3EE7B83D-68E5-48A7-B3A1-AD827FBD1DF2}" destId="{E599A7A1-3968-487C-ADA7-6F5FE62B2C1E}" srcOrd="0" destOrd="0" parTransId="{BBAB9805-D39A-471E-BFFA-4985212F9589}" sibTransId="{4690F7AD-F6AE-450D-B302-F294A051BAB5}"/>
-    <dgm:cxn modelId="{52E5D04C-7D88-4D38-8633-04E010576728}" srcId="{3EE7B83D-68E5-48A7-B3A1-AD827FBD1DF2}" destId="{EB8E0939-6DFD-40B1-BFF3-68B709346EAD}" srcOrd="9" destOrd="0" parTransId="{04C42A93-ABE6-4076-9BBA-067045C459E4}" sibTransId="{6B1B8048-35B4-4914-B9B1-A4AFF2951783}"/>
+    <dgm:cxn modelId="{52E5D04C-7D88-4D38-8633-04E010576728}" srcId="{3EE7B83D-68E5-48A7-B3A1-AD827FBD1DF2}" destId="{EB8E0939-6DFD-40B1-BFF3-68B709346EAD}" srcOrd="8" destOrd="0" parTransId="{04C42A93-ABE6-4076-9BBA-067045C459E4}" sibTransId="{6B1B8048-35B4-4914-B9B1-A4AFF2951783}"/>
     <dgm:cxn modelId="{039CFD50-B242-402C-B68A-477024BBC098}" srcId="{3EE7B83D-68E5-48A7-B3A1-AD827FBD1DF2}" destId="{5D61A70B-CFB2-4761-A147-7121DF45454D}" srcOrd="2" destOrd="0" parTransId="{E4F47B01-EBE2-4331-BDE0-ACD71FB1D2FE}" sibTransId="{C094A2C3-49DD-47B1-B5A7-75C0F7104428}"/>
     <dgm:cxn modelId="{CF17F852-25AC-47E3-BE78-40C970747AF8}" srcId="{3EE7B83D-68E5-48A7-B3A1-AD827FBD1DF2}" destId="{3E48A420-4406-4D17-B38B-E156B9D35328}" srcOrd="5" destOrd="0" parTransId="{693ADC96-C472-4100-B35E-55680AF2F24F}" sibTransId="{CDF363D5-8BFC-463F-9F06-CCE91EB57989}"/>
     <dgm:cxn modelId="{C3060475-FA4B-4E21-BFE3-F6C5DF433032}" srcId="{3EE7B83D-68E5-48A7-B3A1-AD827FBD1DF2}" destId="{5757C7AE-A2CE-46FB-9F32-57D93D7AA4F4}" srcOrd="3" destOrd="0" parTransId="{AE8E3BD5-848E-44F3-BAE4-4F57B2B74526}" sibTransId="{361CF2F7-8131-4D4C-9119-A90C3CDBD947}"/>
     <dgm:cxn modelId="{AD6C9475-1DCA-47F7-A820-F960B540C9E2}" type="presOf" srcId="{EB8E0939-6DFD-40B1-BFF3-68B709346EAD}" destId="{0419303C-207C-4C68-A4A8-99B2954CA40E}" srcOrd="0" destOrd="0" presId="urn:microsoft.com/office/officeart/2005/8/layout/vList2"/>
     <dgm:cxn modelId="{FC8DA28D-695A-46D9-A97A-A16AFC81EB27}" srcId="{3EE7B83D-68E5-48A7-B3A1-AD827FBD1DF2}" destId="{E914C79A-4343-43A9-830A-30FC54736E69}" srcOrd="1" destOrd="0" parTransId="{AEE5D9EC-FF54-4EA4-8093-297EBEBA9E17}" sibTransId="{343ACE92-332F-4ECA-8D25-F843185CA070}"/>
     <dgm:cxn modelId="{502D2798-DAC7-4456-8306-AA3438A26A75}" type="presOf" srcId="{E599A7A1-3968-487C-ADA7-6F5FE62B2C1E}" destId="{BE54A4F7-AA56-4D11-93D2-B8F6B566D5EC}" srcOrd="0" destOrd="0" presId="urn:microsoft.com/office/officeart/2005/8/layout/vList2"/>
-    <dgm:cxn modelId="{E491F7AD-AFDA-4D7E-8318-11FB183E748A}" srcId="{3EE7B83D-68E5-48A7-B3A1-AD827FBD1DF2}" destId="{DE52EBBD-C1E0-478B-BC4B-6BD410BC4878}" srcOrd="7" destOrd="0" parTransId="{CE7CB06A-1CBB-466A-AE92-2DEA75E62EEF}" sibTransId="{690E5620-AA24-4C80-8B47-D7C40C422B14}"/>
     <dgm:cxn modelId="{447B42B3-5E17-41D7-80A9-52D941AF4272}" type="presOf" srcId="{309A7258-5971-43F6-A8CC-4CCECEA554CA}" destId="{AEDA5246-62EE-469D-BE0C-226089261DA4}" srcOrd="0" destOrd="0" presId="urn:microsoft.com/office/officeart/2005/8/layout/vList2"/>
     <dgm:cxn modelId="{28B9A3DD-C96C-4231-AA82-7948ECC10E87}" srcId="{3EE7B83D-68E5-48A7-B3A1-AD827FBD1DF2}" destId="{AD4E01DF-B94F-40BA-A950-CAD0C6BAC213}" srcOrd="6" destOrd="0" parTransId="{F1750691-D488-485C-84EE-75903342ED3A}" sibTransId="{BB3532AF-B99D-44C2-A1C0-5C14E513AE75}"/>
     <dgm:cxn modelId="{1E77C0E3-88A7-4D96-BB0B-48CD5BB1D269}" srcId="{3EE7B83D-68E5-48A7-B3A1-AD827FBD1DF2}" destId="{2F9CFD13-5E09-4066-B45B-5F3A27196AF5}" srcOrd="4" destOrd="0" parTransId="{24456977-4DE6-4D0B-BCA5-0B126416A30E}" sibTransId="{4AECED64-EAE2-4C77-A6E0-6E2121A6B2CE}"/>
@@ -2575,13 +2998,11 @@
     <dgm:cxn modelId="{F45A6EF0-C5A3-4CC3-88C5-E367BCAD1A4F}" type="presParOf" srcId="{EF90A053-B624-4BF4-B5EA-32A076A6E5A4}" destId="{BEE62924-CB34-497C-A181-C22CF0188B01}" srcOrd="11" destOrd="0" presId="urn:microsoft.com/office/officeart/2005/8/layout/vList2"/>
     <dgm:cxn modelId="{99D68893-F088-4128-9B80-12EC2475103C}" type="presParOf" srcId="{EF90A053-B624-4BF4-B5EA-32A076A6E5A4}" destId="{24A5F7E2-0648-4888-AA43-276E1444D225}" srcOrd="12" destOrd="0" presId="urn:microsoft.com/office/officeart/2005/8/layout/vList2"/>
     <dgm:cxn modelId="{9065007E-FF7B-460C-A85E-D28B51A8CDB7}" type="presParOf" srcId="{EF90A053-B624-4BF4-B5EA-32A076A6E5A4}" destId="{B3CCBC5D-B9DF-43FE-AF99-3D3F802624FD}" srcOrd="13" destOrd="0" presId="urn:microsoft.com/office/officeart/2005/8/layout/vList2"/>
-    <dgm:cxn modelId="{2764B420-2672-40EA-9147-99D75DCFC813}" type="presParOf" srcId="{EF90A053-B624-4BF4-B5EA-32A076A6E5A4}" destId="{C7D27D16-127B-4CFA-B969-EF4D744B0EF5}" srcOrd="14" destOrd="0" presId="urn:microsoft.com/office/officeart/2005/8/layout/vList2"/>
-    <dgm:cxn modelId="{F784440E-1308-4DBF-ACF4-6ED7EEC18C6E}" type="presParOf" srcId="{EF90A053-B624-4BF4-B5EA-32A076A6E5A4}" destId="{EE8CA06F-F12B-46B2-BE44-723858A9E1C0}" srcOrd="15" destOrd="0" presId="urn:microsoft.com/office/officeart/2005/8/layout/vList2"/>
-    <dgm:cxn modelId="{A30BDFB2-B7FC-4943-9003-1B0282D88620}" type="presParOf" srcId="{EF90A053-B624-4BF4-B5EA-32A076A6E5A4}" destId="{CA754C5A-7F5F-415B-A46A-DFADE49934B2}" srcOrd="16" destOrd="0" presId="urn:microsoft.com/office/officeart/2005/8/layout/vList2"/>
-    <dgm:cxn modelId="{FBF0823B-8D90-4EBF-963B-5AA6FD24095F}" type="presParOf" srcId="{EF90A053-B624-4BF4-B5EA-32A076A6E5A4}" destId="{40F651EF-4809-4FDC-A2E8-7252540BC2DB}" srcOrd="17" destOrd="0" presId="urn:microsoft.com/office/officeart/2005/8/layout/vList2"/>
-    <dgm:cxn modelId="{094BB0C9-0777-4609-B1A8-A8860F87A22E}" type="presParOf" srcId="{EF90A053-B624-4BF4-B5EA-32A076A6E5A4}" destId="{0419303C-207C-4C68-A4A8-99B2954CA40E}" srcOrd="18" destOrd="0" presId="urn:microsoft.com/office/officeart/2005/8/layout/vList2"/>
-    <dgm:cxn modelId="{EC933BF9-F70D-4E2D-BE56-61A8972630BC}" type="presParOf" srcId="{EF90A053-B624-4BF4-B5EA-32A076A6E5A4}" destId="{FBF92CB0-8E91-402D-8BDC-43B703E16C5F}" srcOrd="19" destOrd="0" presId="urn:microsoft.com/office/officeart/2005/8/layout/vList2"/>
-    <dgm:cxn modelId="{AA3EA613-6000-4A9D-AD0A-E14BB2D8B90B}" type="presParOf" srcId="{EF90A053-B624-4BF4-B5EA-32A076A6E5A4}" destId="{AEDA5246-62EE-469D-BE0C-226089261DA4}" srcOrd="20" destOrd="0" presId="urn:microsoft.com/office/officeart/2005/8/layout/vList2"/>
+    <dgm:cxn modelId="{A30BDFB2-B7FC-4943-9003-1B0282D88620}" type="presParOf" srcId="{EF90A053-B624-4BF4-B5EA-32A076A6E5A4}" destId="{CA754C5A-7F5F-415B-A46A-DFADE49934B2}" srcOrd="14" destOrd="0" presId="urn:microsoft.com/office/officeart/2005/8/layout/vList2"/>
+    <dgm:cxn modelId="{FBF0823B-8D90-4EBF-963B-5AA6FD24095F}" type="presParOf" srcId="{EF90A053-B624-4BF4-B5EA-32A076A6E5A4}" destId="{40F651EF-4809-4FDC-A2E8-7252540BC2DB}" srcOrd="15" destOrd="0" presId="urn:microsoft.com/office/officeart/2005/8/layout/vList2"/>
+    <dgm:cxn modelId="{094BB0C9-0777-4609-B1A8-A8860F87A22E}" type="presParOf" srcId="{EF90A053-B624-4BF4-B5EA-32A076A6E5A4}" destId="{0419303C-207C-4C68-A4A8-99B2954CA40E}" srcOrd="16" destOrd="0" presId="urn:microsoft.com/office/officeart/2005/8/layout/vList2"/>
+    <dgm:cxn modelId="{EC933BF9-F70D-4E2D-BE56-61A8972630BC}" type="presParOf" srcId="{EF90A053-B624-4BF4-B5EA-32A076A6E5A4}" destId="{FBF92CB0-8E91-402D-8BDC-43B703E16C5F}" srcOrd="17" destOrd="0" presId="urn:microsoft.com/office/officeart/2005/8/layout/vList2"/>
+    <dgm:cxn modelId="{AA3EA613-6000-4A9D-AD0A-E14BB2D8B90B}" type="presParOf" srcId="{EF90A053-B624-4BF4-B5EA-32A076A6E5A4}" destId="{AEDA5246-62EE-469D-BE0C-226089261DA4}" srcOrd="18" destOrd="0" presId="urn:microsoft.com/office/officeart/2005/8/layout/vList2"/>
   </dgm:cxnLst>
   <dgm:bg/>
   <dgm:whole/>
@@ -2669,8 +3090,20 @@
             <a:buNone/>
           </a:pPr>
           <a:r>
-            <a:rPr lang="en-US" sz="1100" kern="1200"/>
-            <a:t>Linear Regression – to predict and analyze the correlation of 2 features in our dataset</a:t>
+            <a:rPr lang="en-US" sz="1100" b="1" kern="1200" dirty="0">
+              <a:solidFill>
+                <a:schemeClr val="tx1"/>
+              </a:solidFill>
+            </a:rPr>
+            <a:t>Linear Regression </a:t>
+          </a:r>
+          <a:r>
+            <a:rPr lang="en-US" sz="1100" kern="1200" dirty="0">
+              <a:solidFill>
+                <a:schemeClr val="tx1"/>
+              </a:solidFill>
+            </a:rPr>
+            <a:t>– to predict and analyze the correlation of 2 features in our dataset</a:t>
           </a:r>
         </a:p>
       </dsp:txBody>
@@ -2747,8 +3180,20 @@
             <a:buNone/>
           </a:pPr>
           <a:r>
-            <a:rPr lang="en-US" sz="1100" kern="1200"/>
-            <a:t>K Means – This is an unsupervised learning technique creating clusters of data based on a centroid</a:t>
+            <a:rPr lang="en-US" sz="1100" b="1" kern="1200" dirty="0">
+              <a:solidFill>
+                <a:schemeClr val="tx1"/>
+              </a:solidFill>
+            </a:rPr>
+            <a:t>K Means </a:t>
+          </a:r>
+          <a:r>
+            <a:rPr lang="en-US" sz="1100" kern="1200" dirty="0">
+              <a:solidFill>
+                <a:schemeClr val="tx1"/>
+              </a:solidFill>
+            </a:rPr>
+            <a:t>– This is an unsupervised learning technique creating clusters of data based on a centroid</a:t>
           </a:r>
         </a:p>
       </dsp:txBody>
@@ -2825,8 +3270,20 @@
             <a:buNone/>
           </a:pPr>
           <a:r>
-            <a:rPr lang="en-US" sz="1100" kern="1200"/>
-            <a:t>KNN – This is a clustering technique which analyzes data nearest to other data to predict a diagnosis</a:t>
+            <a:rPr lang="en-US" sz="1100" b="1" kern="1200" dirty="0">
+              <a:solidFill>
+                <a:schemeClr val="tx1"/>
+              </a:solidFill>
+            </a:rPr>
+            <a:t>KNN </a:t>
+          </a:r>
+          <a:r>
+            <a:rPr lang="en-US" sz="1100" kern="1200" dirty="0">
+              <a:solidFill>
+                <a:schemeClr val="tx1"/>
+              </a:solidFill>
+            </a:rPr>
+            <a:t>– This is a clustering technique which analyzes data nearest to other data to predict a diagnosis</a:t>
           </a:r>
         </a:p>
       </dsp:txBody>
@@ -2903,8 +3360,20 @@
             <a:buNone/>
           </a:pPr>
           <a:r>
-            <a:rPr lang="en-US" sz="1100" kern="1200"/>
-            <a:t>Naïve Bayes – This is a technique used to predict cancer by taking features  of our dataset and using the same weight for each -&gt; Assumes data has same effect on output hence Naïve </a:t>
+            <a:rPr lang="en-US" sz="1100" b="1" kern="1200" dirty="0">
+              <a:solidFill>
+                <a:schemeClr val="tx1"/>
+              </a:solidFill>
+            </a:rPr>
+            <a:t>Naïve Bayes </a:t>
+          </a:r>
+          <a:r>
+            <a:rPr lang="en-US" sz="1100" kern="1200" dirty="0">
+              <a:solidFill>
+                <a:schemeClr val="tx1"/>
+              </a:solidFill>
+            </a:rPr>
+            <a:t>– This is a technique used to predict cancer by taking features  of our dataset and using the same weight for each -&gt; Assumes data has same effect on output hence Naïve </a:t>
           </a:r>
         </a:p>
       </dsp:txBody>
@@ -2981,8 +3450,20 @@
             <a:buNone/>
           </a:pPr>
           <a:r>
-            <a:rPr lang="en-US" sz="1100" kern="1200" dirty="0"/>
-            <a:t>Decision Trees – Which were used to predict diagnosis by making a tree of features in our dataset which will either lead to positive or negative diagnosis based on their values</a:t>
+            <a:rPr lang="en-US" sz="1100" b="1" kern="1200" dirty="0">
+              <a:solidFill>
+                <a:schemeClr val="tx1"/>
+              </a:solidFill>
+            </a:rPr>
+            <a:t>Decision Trees </a:t>
+          </a:r>
+          <a:r>
+            <a:rPr lang="en-US" sz="1100" kern="1200" dirty="0">
+              <a:solidFill>
+                <a:schemeClr val="tx1"/>
+              </a:solidFill>
+            </a:rPr>
+            <a:t>– Which were used to predict diagnosis by making a tree of features in our dataset which will either lead to positive or negative diagnosis based on their values</a:t>
           </a:r>
         </a:p>
       </dsp:txBody>
@@ -3059,8 +3540,20 @@
             <a:buNone/>
           </a:pPr>
           <a:r>
-            <a:rPr lang="en-US" sz="1100" kern="1200" dirty="0"/>
-            <a:t>Random Forest – Creates multiple trees then merges the best models to predict our diagnois</a:t>
+            <a:rPr lang="en-US" sz="1100" b="1" kern="1200" dirty="0">
+              <a:solidFill>
+                <a:schemeClr val="tx1"/>
+              </a:solidFill>
+            </a:rPr>
+            <a:t>Random Forest </a:t>
+          </a:r>
+          <a:r>
+            <a:rPr lang="en-US" sz="1100" kern="1200" dirty="0">
+              <a:solidFill>
+                <a:schemeClr val="tx1"/>
+              </a:solidFill>
+            </a:rPr>
+            <a:t>– Extended the decision trees to help remove the over fitting of the individual decision trees by taking the tallied vote of different data/decision tree configurations</a:t>
           </a:r>
         </a:p>
       </dsp:txBody>
@@ -3137,8 +3630,20 @@
             <a:buNone/>
           </a:pPr>
           <a:r>
-            <a:rPr lang="en-US" sz="1100" kern="1200" dirty="0"/>
-            <a:t>PCA (Principle Component Analysis) - unsupervised dimensionality-reduction which reduced features in our dataset by removing similar features which were highly correlated</a:t>
+            <a:rPr lang="en-US" sz="1100" b="1" kern="1200" dirty="0">
+              <a:solidFill>
+                <a:schemeClr val="tx1"/>
+              </a:solidFill>
+            </a:rPr>
+            <a:t>PCA (Principle Component Analysis) </a:t>
+          </a:r>
+          <a:r>
+            <a:rPr lang="en-US" sz="1100" kern="1200" dirty="0">
+              <a:solidFill>
+                <a:schemeClr val="tx1"/>
+              </a:solidFill>
+            </a:rPr>
+            <a:t>- unsupervised dimensionality-reduction which reduced features in our dataset by removing similar features which were highly correlated, while still retaining as much pertinent information as possible.</a:t>
           </a:r>
         </a:p>
       </dsp:txBody>
@@ -3166,7 +3671,7 @@
       </dsp:nvSpPr>
       <dsp:spPr>
         <a:xfrm>
-          <a:off x="0" y="49350"/>
+          <a:off x="0" y="262650"/>
           <a:ext cx="5704764" cy="397800"/>
         </a:xfrm>
         <a:prstGeom prst="roundRect">
@@ -3227,13 +3732,41 @@
             <a:buNone/>
           </a:pPr>
           <a:r>
-            <a:rPr lang="en-US" sz="1000" kern="1200"/>
-            <a:t>Linear Regression was used to analyze the strength of the relationship between certain features and our Diagnosis – Also used Cramérs V </a:t>
+            <a:rPr lang="en-US" sz="1000" b="1" kern="1200" dirty="0">
+              <a:solidFill>
+                <a:schemeClr val="tx1"/>
+              </a:solidFill>
+            </a:rPr>
+            <a:t>Linear Regression </a:t>
+          </a:r>
+          <a:r>
+            <a:rPr lang="en-US" sz="1000" kern="1200" dirty="0">
+              <a:solidFill>
+                <a:schemeClr val="tx1"/>
+              </a:solidFill>
+            </a:rPr>
+            <a:t>was used to analyze the strength of the relationship between certain features and our Diagnosis – Also used </a:t>
+          </a:r>
+          <a:r>
+            <a:rPr lang="en-US" sz="1000" kern="1200" dirty="0" err="1">
+              <a:solidFill>
+                <a:schemeClr val="tx1"/>
+              </a:solidFill>
+            </a:rPr>
+            <a:t>Cramérs</a:t>
+          </a:r>
+          <a:r>
+            <a:rPr lang="en-US" sz="1000" kern="1200" dirty="0">
+              <a:solidFill>
+                <a:schemeClr val="tx1"/>
+              </a:solidFill>
+            </a:rPr>
+            <a:t> V </a:t>
           </a:r>
         </a:p>
       </dsp:txBody>
       <dsp:txXfrm>
-        <a:off x="19419" y="68769"/>
+        <a:off x="19419" y="282069"/>
         <a:ext cx="5665926" cy="358962"/>
       </dsp:txXfrm>
     </dsp:sp>
@@ -3244,7 +3777,7 @@
       </dsp:nvSpPr>
       <dsp:spPr>
         <a:xfrm>
-          <a:off x="0" y="475950"/>
+          <a:off x="0" y="689250"/>
           <a:ext cx="5704764" cy="397800"/>
         </a:xfrm>
         <a:prstGeom prst="roundRect">
@@ -3252,9 +3785,9 @@
         </a:prstGeom>
         <a:solidFill>
           <a:schemeClr val="accent2">
-            <a:hueOff val="-1821060"/>
-            <a:satOff val="293"/>
-            <a:lumOff val="804"/>
+            <a:hueOff val="-2023400"/>
+            <a:satOff val="326"/>
+            <a:lumOff val="893"/>
             <a:alphaOff val="0"/>
           </a:schemeClr>
         </a:solidFill>
@@ -3305,13 +3838,17 @@
             <a:buNone/>
           </a:pPr>
           <a:r>
-            <a:rPr lang="en-US" sz="1000" kern="1200"/>
+            <a:rPr lang="en-US" sz="1000" kern="1200" dirty="0">
+              <a:solidFill>
+                <a:schemeClr val="tx1"/>
+              </a:solidFill>
+            </a:rPr>
             <a:t>Had good results we could see which features were positively correlated with a diagnosis value and the strength of this correlation</a:t>
           </a:r>
         </a:p>
       </dsp:txBody>
       <dsp:txXfrm>
-        <a:off x="19419" y="495369"/>
+        <a:off x="19419" y="708669"/>
         <a:ext cx="5665926" cy="358962"/>
       </dsp:txXfrm>
     </dsp:sp>
@@ -3322,7 +3859,7 @@
       </dsp:nvSpPr>
       <dsp:spPr>
         <a:xfrm>
-          <a:off x="0" y="902550"/>
+          <a:off x="0" y="1115850"/>
           <a:ext cx="5704764" cy="397800"/>
         </a:xfrm>
         <a:prstGeom prst="roundRect">
@@ -3330,9 +3867,9 @@
         </a:prstGeom>
         <a:solidFill>
           <a:schemeClr val="accent2">
-            <a:hueOff val="-3642120"/>
-            <a:satOff val="586"/>
-            <a:lumOff val="1608"/>
+            <a:hueOff val="-4046800"/>
+            <a:satOff val="651"/>
+            <a:lumOff val="1787"/>
             <a:alphaOff val="0"/>
           </a:schemeClr>
         </a:solidFill>
@@ -3383,13 +3920,41 @@
             <a:buNone/>
           </a:pPr>
           <a:r>
-            <a:rPr lang="en-US" sz="1000" kern="1200"/>
-            <a:t>K Means – Performed fairly well with 86% accuracy</a:t>
+            <a:rPr lang="en-US" sz="1000" b="1" kern="1200" dirty="0">
+              <a:solidFill>
+                <a:schemeClr val="tx1"/>
+              </a:solidFill>
+            </a:rPr>
+            <a:t>K Means </a:t>
+          </a:r>
+          <a:r>
+            <a:rPr lang="en-US" sz="1000" kern="1200" dirty="0">
+              <a:solidFill>
+                <a:schemeClr val="tx1"/>
+              </a:solidFill>
+            </a:rPr>
+            <a:t>– Performed fairly well with </a:t>
+          </a:r>
+          <a:r>
+            <a:rPr lang="en-US" sz="1000" b="1" kern="1200" dirty="0">
+              <a:solidFill>
+                <a:schemeClr val="tx1"/>
+              </a:solidFill>
+            </a:rPr>
+            <a:t>86% </a:t>
+          </a:r>
+          <a:r>
+            <a:rPr lang="en-US" sz="1000" kern="1200" dirty="0">
+              <a:solidFill>
+                <a:schemeClr val="tx1"/>
+              </a:solidFill>
+            </a:rPr>
+            <a:t>accuracy</a:t>
           </a:r>
         </a:p>
       </dsp:txBody>
       <dsp:txXfrm>
-        <a:off x="19419" y="921969"/>
+        <a:off x="19419" y="1135269"/>
         <a:ext cx="5665926" cy="358962"/>
       </dsp:txXfrm>
     </dsp:sp>
@@ -3400,7 +3965,7 @@
       </dsp:nvSpPr>
       <dsp:spPr>
         <a:xfrm>
-          <a:off x="0" y="1329150"/>
+          <a:off x="0" y="1542450"/>
           <a:ext cx="5704764" cy="397800"/>
         </a:xfrm>
         <a:prstGeom prst="roundRect">
@@ -3408,9 +3973,9 @@
         </a:prstGeom>
         <a:solidFill>
           <a:schemeClr val="accent2">
-            <a:hueOff val="-5463181"/>
-            <a:satOff val="879"/>
-            <a:lumOff val="2412"/>
+            <a:hueOff val="-6070200"/>
+            <a:satOff val="977"/>
+            <a:lumOff val="2680"/>
             <a:alphaOff val="0"/>
           </a:schemeClr>
         </a:solidFill>
@@ -3461,13 +4026,41 @@
             <a:buNone/>
           </a:pPr>
           <a:r>
-            <a:rPr lang="en-US" sz="1000" kern="1200"/>
-            <a:t>KNN – Performed better than KNN with 91% accuracy</a:t>
+            <a:rPr lang="en-US" sz="1000" b="1" kern="1200" dirty="0">
+              <a:solidFill>
+                <a:schemeClr val="tx1"/>
+              </a:solidFill>
+            </a:rPr>
+            <a:t>KNN </a:t>
+          </a:r>
+          <a:r>
+            <a:rPr lang="en-US" sz="1000" kern="1200" dirty="0">
+              <a:solidFill>
+                <a:schemeClr val="tx1"/>
+              </a:solidFill>
+            </a:rPr>
+            <a:t>– Performed better than KNN with </a:t>
+          </a:r>
+          <a:r>
+            <a:rPr lang="en-US" sz="1000" b="1" kern="1200" dirty="0">
+              <a:solidFill>
+                <a:schemeClr val="tx1"/>
+              </a:solidFill>
+            </a:rPr>
+            <a:t>91% </a:t>
+          </a:r>
+          <a:r>
+            <a:rPr lang="en-US" sz="1000" kern="1200" dirty="0">
+              <a:solidFill>
+                <a:schemeClr val="tx1"/>
+              </a:solidFill>
+            </a:rPr>
+            <a:t>accuracy</a:t>
           </a:r>
         </a:p>
       </dsp:txBody>
       <dsp:txXfrm>
-        <a:off x="19419" y="1348569"/>
+        <a:off x="19419" y="1561869"/>
         <a:ext cx="5665926" cy="358962"/>
       </dsp:txXfrm>
     </dsp:sp>
@@ -3478,7 +4071,7 @@
       </dsp:nvSpPr>
       <dsp:spPr>
         <a:xfrm>
-          <a:off x="0" y="1755750"/>
+          <a:off x="0" y="1969050"/>
           <a:ext cx="5704764" cy="397800"/>
         </a:xfrm>
         <a:prstGeom prst="roundRect">
@@ -3486,9 +4079,9 @@
         </a:prstGeom>
         <a:solidFill>
           <a:schemeClr val="accent2">
-            <a:hueOff val="-7284240"/>
-            <a:satOff val="1172"/>
-            <a:lumOff val="3216"/>
+            <a:hueOff val="-8093600"/>
+            <a:satOff val="1303"/>
+            <a:lumOff val="3573"/>
             <a:alphaOff val="0"/>
           </a:schemeClr>
         </a:solidFill>
@@ -3539,13 +4132,41 @@
             <a:buNone/>
           </a:pPr>
           <a:r>
-            <a:rPr lang="en-US" sz="1000" kern="1200"/>
-            <a:t>Gaussian Naïve Bayes – without smoothing or scaling had 90% accuracy on testset </a:t>
+            <a:rPr lang="en-US" sz="1000" b="1" kern="1200" dirty="0">
+              <a:solidFill>
+                <a:schemeClr val="tx1"/>
+              </a:solidFill>
+            </a:rPr>
+            <a:t>Gaussian Naïve Bayes </a:t>
+          </a:r>
+          <a:r>
+            <a:rPr lang="en-US" sz="1000" kern="1200" dirty="0">
+              <a:solidFill>
+                <a:schemeClr val="tx1"/>
+              </a:solidFill>
+            </a:rPr>
+            <a:t>– without smoothing or scaling had </a:t>
+          </a:r>
+          <a:r>
+            <a:rPr lang="en-US" sz="1000" b="1" kern="1200" dirty="0">
+              <a:solidFill>
+                <a:schemeClr val="tx1"/>
+              </a:solidFill>
+            </a:rPr>
+            <a:t>90% </a:t>
+          </a:r>
+          <a:r>
+            <a:rPr lang="en-US" sz="1000" kern="1200" dirty="0">
+              <a:solidFill>
+                <a:schemeClr val="tx1"/>
+              </a:solidFill>
+            </a:rPr>
+            <a:t>accuracy on test set </a:t>
           </a:r>
         </a:p>
       </dsp:txBody>
       <dsp:txXfrm>
-        <a:off x="19419" y="1775169"/>
+        <a:off x="19419" y="1988469"/>
         <a:ext cx="5665926" cy="358962"/>
       </dsp:txXfrm>
     </dsp:sp>
@@ -3556,7 +4177,7 @@
       </dsp:nvSpPr>
       <dsp:spPr>
         <a:xfrm>
-          <a:off x="0" y="2182350"/>
+          <a:off x="0" y="2395650"/>
           <a:ext cx="5704764" cy="397800"/>
         </a:xfrm>
         <a:prstGeom prst="roundRect">
@@ -3564,9 +4185,9 @@
         </a:prstGeom>
         <a:solidFill>
           <a:schemeClr val="accent2">
-            <a:hueOff val="-9105300"/>
-            <a:satOff val="1465"/>
-            <a:lumOff val="4020"/>
+            <a:hueOff val="-10117001"/>
+            <a:satOff val="1628"/>
+            <a:lumOff val="4467"/>
             <a:alphaOff val="0"/>
           </a:schemeClr>
         </a:solidFill>
@@ -3617,13 +4238,41 @@
             <a:buNone/>
           </a:pPr>
           <a:r>
-            <a:rPr lang="en-US" sz="1000" kern="1200" dirty="0"/>
-            <a:t>Gaussian Naïve Bayes with scaling had around a 91% accuracy rate – not much improvement</a:t>
+            <a:rPr lang="en-US" sz="1000" b="1" kern="1200" dirty="0">
+              <a:solidFill>
+                <a:schemeClr val="tx1"/>
+              </a:solidFill>
+            </a:rPr>
+            <a:t>Gaussian Naïve Bayes </a:t>
+          </a:r>
+          <a:r>
+            <a:rPr lang="en-US" sz="1000" kern="1200" dirty="0">
+              <a:solidFill>
+                <a:schemeClr val="tx1"/>
+              </a:solidFill>
+            </a:rPr>
+            <a:t>with scaling had around a </a:t>
+          </a:r>
+          <a:r>
+            <a:rPr lang="en-US" sz="1000" b="1" kern="1200" dirty="0">
+              <a:solidFill>
+                <a:schemeClr val="tx1"/>
+              </a:solidFill>
+            </a:rPr>
+            <a:t>91% </a:t>
+          </a:r>
+          <a:r>
+            <a:rPr lang="en-US" sz="1000" kern="1200" dirty="0">
+              <a:solidFill>
+                <a:schemeClr val="tx1"/>
+              </a:solidFill>
+            </a:rPr>
+            <a:t>accuracy rate – not much improvement</a:t>
           </a:r>
         </a:p>
       </dsp:txBody>
       <dsp:txXfrm>
-        <a:off x="19419" y="2201769"/>
+        <a:off x="19419" y="2415069"/>
         <a:ext cx="5665926" cy="358962"/>
       </dsp:txXfrm>
     </dsp:sp>
@@ -3634,7 +4283,7 @@
       </dsp:nvSpPr>
       <dsp:spPr>
         <a:xfrm>
-          <a:off x="0" y="2608950"/>
+          <a:off x="0" y="2805317"/>
           <a:ext cx="5704764" cy="397800"/>
         </a:xfrm>
         <a:prstGeom prst="roundRect">
@@ -3642,9 +4291,9 @@
         </a:prstGeom>
         <a:solidFill>
           <a:schemeClr val="accent2">
-            <a:hueOff val="-10926361"/>
-            <a:satOff val="1759"/>
-            <a:lumOff val="4824"/>
+            <a:hueOff val="-12140401"/>
+            <a:satOff val="1954"/>
+            <a:lumOff val="5360"/>
             <a:alphaOff val="0"/>
           </a:schemeClr>
         </a:solidFill>
@@ -3695,24 +4344,76 @@
             <a:buNone/>
           </a:pPr>
           <a:r>
-            <a:rPr lang="en-US" sz="1000" kern="1200" dirty="0"/>
-            <a:t>Decision Tree model had an accuracy of 93%</a:t>
+            <a:rPr lang="en-US" sz="1000" kern="1200" dirty="0">
+              <a:solidFill>
+                <a:schemeClr val="tx1"/>
+              </a:solidFill>
+            </a:rPr>
+            <a:t>Most of our </a:t>
+          </a:r>
+          <a:r>
+            <a:rPr lang="en-US" sz="1000" b="1" kern="1200" dirty="0">
+              <a:solidFill>
+                <a:schemeClr val="tx1"/>
+              </a:solidFill>
+            </a:rPr>
+            <a:t>Decision Tree </a:t>
+          </a:r>
+          <a:r>
+            <a:rPr lang="en-US" sz="1000" kern="1200" dirty="0">
+              <a:solidFill>
+                <a:schemeClr val="tx1"/>
+              </a:solidFill>
+            </a:rPr>
+            <a:t>and </a:t>
+          </a:r>
+          <a:r>
+            <a:rPr lang="en-US" sz="1000" b="1" kern="1200" dirty="0">
+              <a:solidFill>
+                <a:schemeClr val="tx1"/>
+              </a:solidFill>
+            </a:rPr>
+            <a:t>Random Forest </a:t>
+          </a:r>
+          <a:r>
+            <a:rPr lang="en-US" sz="1000" kern="1200" dirty="0">
+              <a:solidFill>
+                <a:schemeClr val="tx1"/>
+              </a:solidFill>
+            </a:rPr>
+            <a:t>models had a had high degree of  accuracy. However with our smaller dataset we must consider the possibility of </a:t>
+          </a:r>
+          <a:r>
+            <a:rPr lang="en-US" sz="1000" b="1" kern="1200" dirty="0">
+              <a:solidFill>
+                <a:schemeClr val="tx1"/>
+              </a:solidFill>
+            </a:rPr>
+            <a:t>over fitting</a:t>
+          </a:r>
+          <a:r>
+            <a:rPr lang="en-US" sz="1000" kern="1200" dirty="0">
+              <a:solidFill>
+                <a:schemeClr val="tx1"/>
+              </a:solidFill>
+            </a:rPr>
+            <a:t>.</a:t>
           </a:r>
         </a:p>
       </dsp:txBody>
       <dsp:txXfrm>
-        <a:off x="19419" y="2628369"/>
+        <a:off x="19419" y="2824736"/>
         <a:ext cx="5665926" cy="358962"/>
       </dsp:txXfrm>
     </dsp:sp>
-    <dsp:sp modelId="{C7D27D16-127B-4CFA-B969-EF4D744B0EF5}">
+    <dsp:sp modelId="{CA754C5A-7F5F-415B-A46A-DFADE49934B2}">
       <dsp:nvSpPr>
         <dsp:cNvPr id="0" name=""/>
         <dsp:cNvSpPr/>
       </dsp:nvSpPr>
       <dsp:spPr>
         <a:xfrm>
-          <a:off x="0" y="3035549"/>
+          <a:off x="0" y="3248849"/>
           <a:ext cx="5704764" cy="397800"/>
         </a:xfrm>
         <a:prstGeom prst="roundRect">
@@ -3720,9 +4421,9 @@
         </a:prstGeom>
         <a:solidFill>
           <a:schemeClr val="accent2">
-            <a:hueOff val="-12747420"/>
-            <a:satOff val="2052"/>
-            <a:lumOff val="5628"/>
+            <a:hueOff val="-14163800"/>
+            <a:satOff val="2280"/>
+            <a:lumOff val="6253"/>
             <a:alphaOff val="0"/>
           </a:schemeClr>
         </a:solidFill>
@@ -3773,24 +4474,52 @@
             <a:buNone/>
           </a:pPr>
           <a:r>
-            <a:rPr lang="en-US" sz="1000" kern="1200" dirty="0"/>
-            <a:t>Random forest had around the same degree of accuracy</a:t>
+            <a:rPr lang="en-US" sz="1000" b="1" kern="1200" dirty="0">
+              <a:solidFill>
+                <a:schemeClr val="tx1"/>
+              </a:solidFill>
+            </a:rPr>
+            <a:t>Entropy Forest </a:t>
+          </a:r>
+          <a:r>
+            <a:rPr lang="en-US" sz="1000" kern="1200" dirty="0">
+              <a:solidFill>
+                <a:schemeClr val="tx1"/>
+              </a:solidFill>
+            </a:rPr>
+            <a:t>had </a:t>
+          </a:r>
+          <a:r>
+            <a:rPr lang="en-US" sz="1000" b="1" kern="1200" dirty="0">
+              <a:solidFill>
+                <a:schemeClr val="tx1"/>
+              </a:solidFill>
+            </a:rPr>
+            <a:t>90% </a:t>
+          </a:r>
+          <a:r>
+            <a:rPr lang="en-US" sz="1000" kern="1200" dirty="0">
+              <a:solidFill>
+                <a:schemeClr val="tx1"/>
+              </a:solidFill>
+            </a:rPr>
+            <a:t>accuracy</a:t>
           </a:r>
         </a:p>
       </dsp:txBody>
       <dsp:txXfrm>
-        <a:off x="19419" y="3054968"/>
+        <a:off x="19419" y="3268268"/>
         <a:ext cx="5665926" cy="358962"/>
       </dsp:txXfrm>
     </dsp:sp>
-    <dsp:sp modelId="{CA754C5A-7F5F-415B-A46A-DFADE49934B2}">
+    <dsp:sp modelId="{0419303C-207C-4C68-A4A8-99B2954CA40E}">
       <dsp:nvSpPr>
         <dsp:cNvPr id="0" name=""/>
         <dsp:cNvSpPr/>
       </dsp:nvSpPr>
       <dsp:spPr>
         <a:xfrm>
-          <a:off x="0" y="3462149"/>
+          <a:off x="0" y="3675449"/>
           <a:ext cx="5704764" cy="397800"/>
         </a:xfrm>
         <a:prstGeom prst="roundRect">
@@ -3798,9 +4527,9 @@
         </a:prstGeom>
         <a:solidFill>
           <a:schemeClr val="accent2">
-            <a:hueOff val="-14568481"/>
-            <a:satOff val="2345"/>
-            <a:lumOff val="6432"/>
+            <a:hueOff val="-16187201"/>
+            <a:satOff val="2605"/>
+            <a:lumOff val="7147"/>
             <a:alphaOff val="0"/>
           </a:schemeClr>
         </a:solidFill>
@@ -3851,91 +4580,33 @@
             <a:buNone/>
           </a:pPr>
           <a:r>
-            <a:rPr lang="en-US" sz="1000" kern="1200" dirty="0"/>
-            <a:t>Entropy Forest had 90% accuracy</a:t>
+            <a:rPr lang="en-US" sz="1000" b="1" kern="1200" dirty="0">
+              <a:solidFill>
+                <a:schemeClr val="tx1"/>
+              </a:solidFill>
+            </a:rPr>
+            <a:t>PCA Gini Tree </a:t>
+          </a:r>
+          <a:r>
+            <a:rPr lang="en-US" sz="1000" kern="1200" dirty="0">
+              <a:solidFill>
+                <a:schemeClr val="tx1"/>
+              </a:solidFill>
+            </a:rPr>
+            <a:t>had an accuracy of </a:t>
+          </a:r>
+          <a:r>
+            <a:rPr lang="en-US" sz="1000" b="1" kern="1200" dirty="0">
+              <a:solidFill>
+                <a:schemeClr val="tx1"/>
+              </a:solidFill>
+            </a:rPr>
+            <a:t>94%</a:t>
           </a:r>
         </a:p>
       </dsp:txBody>
       <dsp:txXfrm>
-        <a:off x="19419" y="3481568"/>
-        <a:ext cx="5665926" cy="358962"/>
-      </dsp:txXfrm>
-    </dsp:sp>
-    <dsp:sp modelId="{0419303C-207C-4C68-A4A8-99B2954CA40E}">
-      <dsp:nvSpPr>
-        <dsp:cNvPr id="0" name=""/>
-        <dsp:cNvSpPr/>
-      </dsp:nvSpPr>
-      <dsp:spPr>
-        <a:xfrm>
-          <a:off x="0" y="3888749"/>
-          <a:ext cx="5704764" cy="397800"/>
-        </a:xfrm>
-        <a:prstGeom prst="roundRect">
-          <a:avLst/>
-        </a:prstGeom>
-        <a:solidFill>
-          <a:schemeClr val="accent2">
-            <a:hueOff val="-16389540"/>
-            <a:satOff val="2638"/>
-            <a:lumOff val="7236"/>
-            <a:alphaOff val="0"/>
-          </a:schemeClr>
-        </a:solidFill>
-        <a:ln w="12700" cap="flat" cmpd="sng" algn="ctr">
-          <a:solidFill>
-            <a:schemeClr val="lt1">
-              <a:hueOff val="0"/>
-              <a:satOff val="0"/>
-              <a:lumOff val="0"/>
-              <a:alphaOff val="0"/>
-            </a:schemeClr>
-          </a:solidFill>
-          <a:prstDash val="solid"/>
-          <a:miter lim="800000"/>
-        </a:ln>
-        <a:effectLst/>
-      </dsp:spPr>
-      <dsp:style>
-        <a:lnRef idx="2">
-          <a:scrgbClr r="0" g="0" b="0"/>
-        </a:lnRef>
-        <a:fillRef idx="1">
-          <a:scrgbClr r="0" g="0" b="0"/>
-        </a:fillRef>
-        <a:effectRef idx="0">
-          <a:scrgbClr r="0" g="0" b="0"/>
-        </a:effectRef>
-        <a:fontRef idx="minor">
-          <a:schemeClr val="lt1"/>
-        </a:fontRef>
-      </dsp:style>
-      <dsp:txBody>
-        <a:bodyPr spcFirstLastPara="0" vert="horz" wrap="square" lIns="38100" tIns="38100" rIns="38100" bIns="38100" numCol="1" spcCol="1270" anchor="ctr" anchorCtr="0">
-          <a:noAutofit/>
-        </a:bodyPr>
-        <a:lstStyle/>
-        <a:p>
-          <a:pPr marL="0" lvl="0" indent="0" algn="l" defTabSz="444500">
-            <a:lnSpc>
-              <a:spcPct val="90000"/>
-            </a:lnSpc>
-            <a:spcBef>
-              <a:spcPct val="0"/>
-            </a:spcBef>
-            <a:spcAft>
-              <a:spcPct val="35000"/>
-            </a:spcAft>
-            <a:buNone/>
-          </a:pPr>
-          <a:r>
-            <a:rPr lang="en-US" sz="1000" kern="1200" dirty="0"/>
-            <a:t>PCA Gini Tree had an accuracy of 0.94%</a:t>
-          </a:r>
-        </a:p>
-      </dsp:txBody>
-      <dsp:txXfrm>
-        <a:off x="19419" y="3908168"/>
+        <a:off x="19419" y="3694868"/>
         <a:ext cx="5665926" cy="358962"/>
       </dsp:txXfrm>
     </dsp:sp>
@@ -3946,7 +4617,7 @@
       </dsp:nvSpPr>
       <dsp:spPr>
         <a:xfrm>
-          <a:off x="0" y="4315349"/>
+          <a:off x="0" y="4102049"/>
           <a:ext cx="5704764" cy="397800"/>
         </a:xfrm>
         <a:prstGeom prst="roundRect">
@@ -4007,13 +4678,33 @@
             <a:buNone/>
           </a:pPr>
           <a:r>
-            <a:rPr lang="en-US" sz="1000" kern="1200" dirty="0"/>
-            <a:t>PCA Random forest had the best accuracy of all our models at 97%</a:t>
+            <a:rPr lang="en-US" sz="1000" b="1" kern="1200" dirty="0">
+              <a:solidFill>
+                <a:schemeClr val="tx1"/>
+              </a:solidFill>
+            </a:rPr>
+            <a:t>PCA Random Forest </a:t>
+          </a:r>
+          <a:r>
+            <a:rPr lang="en-US" sz="1000" kern="1200" dirty="0">
+              <a:solidFill>
+                <a:schemeClr val="tx1"/>
+              </a:solidFill>
+            </a:rPr>
+            <a:t>had the best accuracy of all our models at </a:t>
+          </a:r>
+          <a:r>
+            <a:rPr lang="en-US" sz="1000" b="1" kern="1200" dirty="0">
+              <a:solidFill>
+                <a:schemeClr val="tx1"/>
+              </a:solidFill>
+            </a:rPr>
+            <a:t>97%</a:t>
           </a:r>
         </a:p>
       </dsp:txBody>
       <dsp:txXfrm>
-        <a:off x="19419" y="4334768"/>
+        <a:off x="19419" y="4121468"/>
         <a:ext cx="5665926" cy="358962"/>
       </dsp:txXfrm>
     </dsp:sp>
@@ -6517,7 +7208,7 @@
           <a:p>
             <a:fld id="{837E2813-601B-4697-B14D-165027600992}" type="datetimeFigureOut">
               <a:rPr lang="en-US" smtClean="0"/>
-              <a:t>11/22/2021</a:t>
+              <a:t>11/23/2021</a:t>
             </a:fld>
             <a:endParaRPr lang="en-US"/>
           </a:p>
@@ -6694,7 +7385,7 @@
           <a:p>
             <a:fld id="{F13F8F91-4F38-4A01-947F-C76C21BA8A7A}" type="datetimeFigureOut">
               <a:rPr lang="en-US" smtClean="0"/>
-              <a:t>11/22/2021</a:t>
+              <a:t>11/23/2021</a:t>
             </a:fld>
             <a:endParaRPr lang="en-US"/>
           </a:p>
@@ -7465,7 +8156,7 @@
           <a:p>
             <a:fld id="{53BEF823-48A5-43FC-BE03-E79964288B41}" type="datetimeFigureOut">
               <a:rPr lang="en-US" smtClean="0"/>
-              <a:t>11/22/2021</a:t>
+              <a:t>11/23/2021</a:t>
             </a:fld>
             <a:endParaRPr lang="en-US"/>
           </a:p>
@@ -7676,7 +8367,7 @@
             <a:fld id="{53BEF823-48A5-43FC-BE03-E79964288B41}" type="datetimeFigureOut">
               <a:rPr lang="en-US" smtClean="0"/>
               <a:pPr algn="r"/>
-              <a:t>11/22/2021</a:t>
+              <a:t>11/23/2021</a:t>
             </a:fld>
             <a:endParaRPr lang="en-US"/>
           </a:p>
@@ -7889,7 +8580,7 @@
             <a:fld id="{53BEF823-48A5-43FC-BE03-E79964288B41}" type="datetimeFigureOut">
               <a:rPr lang="en-US" smtClean="0"/>
               <a:pPr algn="r"/>
-              <a:t>11/22/2021</a:t>
+              <a:t>11/23/2021</a:t>
             </a:fld>
             <a:endParaRPr lang="en-US"/>
           </a:p>
@@ -8092,7 +8783,7 @@
             <a:fld id="{53BEF823-48A5-43FC-BE03-E79964288B41}" type="datetimeFigureOut">
               <a:rPr lang="en-US" smtClean="0"/>
               <a:pPr algn="r"/>
-              <a:t>11/22/2021</a:t>
+              <a:t>11/23/2021</a:t>
             </a:fld>
             <a:endParaRPr lang="en-US"/>
           </a:p>
@@ -8375,7 +9066,7 @@
             <a:fld id="{53BEF823-48A5-43FC-BE03-E79964288B41}" type="datetimeFigureOut">
               <a:rPr lang="en-US" smtClean="0"/>
               <a:pPr algn="r"/>
-              <a:t>11/22/2021</a:t>
+              <a:t>11/23/2021</a:t>
             </a:fld>
             <a:endParaRPr lang="en-US"/>
           </a:p>
@@ -8617,7 +9308,7 @@
             <a:fld id="{53BEF823-48A5-43FC-BE03-E79964288B41}" type="datetimeFigureOut">
               <a:rPr lang="en-US" smtClean="0"/>
               <a:pPr algn="r"/>
-              <a:t>11/22/2021</a:t>
+              <a:t>11/23/2021</a:t>
             </a:fld>
             <a:endParaRPr lang="en-US"/>
           </a:p>
@@ -9057,7 +9748,7 @@
             <a:fld id="{53BEF823-48A5-43FC-BE03-E79964288B41}" type="datetimeFigureOut">
               <a:rPr lang="en-US" smtClean="0"/>
               <a:pPr algn="r"/>
-              <a:t>11/22/2021</a:t>
+              <a:t>11/23/2021</a:t>
             </a:fld>
             <a:endParaRPr lang="en-US"/>
           </a:p>
@@ -9203,7 +9894,7 @@
             <a:fld id="{53BEF823-48A5-43FC-BE03-E79964288B41}" type="datetimeFigureOut">
               <a:rPr lang="en-US" smtClean="0"/>
               <a:pPr algn="r"/>
-              <a:t>11/22/2021</a:t>
+              <a:t>11/23/2021</a:t>
             </a:fld>
             <a:endParaRPr lang="en-US"/>
           </a:p>
@@ -9321,7 +10012,7 @@
             <a:fld id="{53BEF823-48A5-43FC-BE03-E79964288B41}" type="datetimeFigureOut">
               <a:rPr lang="en-US" smtClean="0"/>
               <a:pPr algn="r"/>
-              <a:t>11/22/2021</a:t>
+              <a:t>11/23/2021</a:t>
             </a:fld>
             <a:endParaRPr lang="en-US"/>
           </a:p>
@@ -9604,7 +10295,7 @@
             <a:fld id="{53BEF823-48A5-43FC-BE03-E79964288B41}" type="datetimeFigureOut">
               <a:rPr lang="en-US" smtClean="0"/>
               <a:pPr algn="r"/>
-              <a:t>11/22/2021</a:t>
+              <a:t>11/23/2021</a:t>
             </a:fld>
             <a:endParaRPr lang="en-US"/>
           </a:p>
@@ -9898,7 +10589,7 @@
             <a:fld id="{53BEF823-48A5-43FC-BE03-E79964288B41}" type="datetimeFigureOut">
               <a:rPr lang="en-US" smtClean="0"/>
               <a:pPr algn="r"/>
-              <a:t>11/22/2021</a:t>
+              <a:t>11/23/2021</a:t>
             </a:fld>
             <a:endParaRPr lang="en-US"/>
           </a:p>
@@ -10391,7 +11082,7 @@
             <a:fld id="{53BEF823-48A5-43FC-BE03-E79964288B41}" type="datetimeFigureOut">
               <a:rPr lang="en-US" smtClean="0"/>
               <a:pPr algn="r"/>
-              <a:t>11/22/2021</a:t>
+              <a:t>11/23/2021</a:t>
             </a:fld>
             <a:endParaRPr lang="en-US"/>
           </a:p>
@@ -12668,7 +13359,7 @@
             <p:ph idx="1"/>
             <p:extLst>
               <p:ext uri="{D42A27DB-BD31-4B8C-83A1-F6EECF244321}">
-                <p14:modId xmlns:p14="http://schemas.microsoft.com/office/powerpoint/2010/main" val="2409994751"/>
+                <p14:modId xmlns:p14="http://schemas.microsoft.com/office/powerpoint/2010/main" val="1243237260"/>
               </p:ext>
             </p:extLst>
           </p:nvPr>
@@ -13126,13 +13817,13 @@
             <p:ph idx="1"/>
             <p:extLst>
               <p:ext uri="{D42A27DB-BD31-4B8C-83A1-F6EECF244321}">
-                <p14:modId xmlns:p14="http://schemas.microsoft.com/office/powerpoint/2010/main" val="1557552557"/>
+                <p14:modId xmlns:p14="http://schemas.microsoft.com/office/powerpoint/2010/main" val="3072999903"/>
               </p:ext>
             </p:extLst>
           </p:nvPr>
         </p:nvGraphicFramePr>
         <p:xfrm>
-          <a:off x="5725236" y="758825"/>
+          <a:off x="5728284" y="758952"/>
           <a:ext cx="5704764" cy="4762500"/>
         </p:xfrm>
         <a:graphic>
@@ -13362,29 +14053,33 @@
           <a:p>
             <a:r>
               <a:rPr lang="en-US" dirty="0"/>
-              <a:t>Here we can see our final results table</a:t>
+              <a:t>Here we can see our </a:t>
+            </a:r>
+            <a:r>
+              <a:rPr lang="en-US" b="1" dirty="0"/>
+              <a:t>final results </a:t>
+            </a:r>
+            <a:r>
+              <a:rPr lang="en-US" dirty="0"/>
+              <a:t>table</a:t>
             </a:r>
           </a:p>
           <a:p>
             <a:r>
-              <a:rPr lang="en-US"/>
+              <a:rPr lang="en-US" dirty="0"/>
               <a:t>Notice which models performed correctly and which didn't</a:t>
             </a:r>
           </a:p>
           <a:p>
             <a:r>
-              <a:rPr lang="en-US"/>
+              <a:rPr lang="en-US" dirty="0"/>
               <a:t>Trial and error process – it took time finding the right ratio of the training / test sets</a:t>
             </a:r>
           </a:p>
           <a:p>
             <a:r>
               <a:rPr lang="en-US" dirty="0"/>
-              <a:t>Also it took time to analyze the models and determine how we could get the </a:t>
-            </a:r>
-            <a:r>
-              <a:rPr lang="en-US"/>
-              <a:t>best performance from them</a:t>
+              <a:t>Also it took time to analyze the models and determine how we could get the best performance from them</a:t>
             </a:r>
             <a:br>
               <a:rPr lang="en-US" dirty="0"/>
@@ -13404,11 +14099,11 @@
               </a:spcAft>
             </a:pPr>
             <a:r>
-              <a:rPr lang="en-US">
+              <a:rPr lang="en-US" dirty="0">
                 <a:ea typeface="+mn-lt"/>
                 <a:cs typeface="+mn-lt"/>
               </a:rPr>
-              <a:t>From our study we we determined PCA Random Forest had the best accuracy when predicting the diagnosis</a:t>
+              <a:t>From our study we determined PCA Random Forest had the best accuracy when predicting the diagnosis</a:t>
             </a:r>
             <a:br>
               <a:rPr lang="en-US" dirty="0">
@@ -13434,7 +14129,7 @@
               </a:spcAft>
             </a:pPr>
             <a:r>
-              <a:rPr lang="en-US">
+              <a:rPr lang="en-US" dirty="0">
                 <a:ea typeface="+mn-lt"/>
                 <a:cs typeface="+mn-lt"/>
               </a:rPr>
@@ -13464,7 +14159,7 @@
               </a:spcAft>
             </a:pPr>
             <a:r>
-              <a:rPr lang="en-US">
+              <a:rPr lang="en-US" dirty="0">
                 <a:ea typeface="+mn-lt"/>
                 <a:cs typeface="+mn-lt"/>
               </a:rPr>
@@ -13494,11 +14189,25 @@
               </a:spcAft>
             </a:pPr>
             <a:r>
-              <a:rPr lang="en-US">
+              <a:rPr lang="en-US" dirty="0">
                 <a:ea typeface="+mn-lt"/>
                 <a:cs typeface="+mn-lt"/>
               </a:rPr>
-              <a:t>We learned which models worked on our dataset and which didn't – it was a fairly small set of only 570 values!</a:t>
+              <a:t>We learned which models worked on our dataset and which didn't – it was a fairly small set of only </a:t>
+            </a:r>
+            <a:r>
+              <a:rPr lang="en-US" b="1" dirty="0">
+                <a:ea typeface="+mn-lt"/>
+                <a:cs typeface="+mn-lt"/>
+              </a:rPr>
+              <a:t>570 values</a:t>
+            </a:r>
+            <a:r>
+              <a:rPr lang="en-US" dirty="0">
+                <a:ea typeface="+mn-lt"/>
+                <a:cs typeface="+mn-lt"/>
+              </a:rPr>
+              <a:t>!</a:t>
             </a:r>
           </a:p>
           <a:p>
@@ -13642,36 +14351,6 @@
           </a:p>
         </p:txBody>
       </p:sp>
-      <p:pic>
-        <p:nvPicPr>
-          <p:cNvPr id="4" name="Picture 4" descr="Table&#10;&#10;Description automatically generated">
-            <a:extLst>
-              <a:ext uri="{FF2B5EF4-FFF2-40B4-BE49-F238E27FC236}">
-                <a16:creationId xmlns:a16="http://schemas.microsoft.com/office/drawing/2014/main" id="{A92974E5-2723-43D0-9D48-440ED6AB36E1}"/>
-              </a:ext>
-            </a:extLst>
-          </p:cNvPr>
-          <p:cNvPicPr>
-            <a:picLocks noChangeAspect="1"/>
-          </p:cNvPicPr>
-          <p:nvPr/>
-        </p:nvPicPr>
-        <p:blipFill>
-          <a:blip r:embed="rId2"/>
-          <a:stretch>
-            <a:fillRect/>
-          </a:stretch>
-        </p:blipFill>
-        <p:spPr>
-          <a:xfrm>
-            <a:off x="8150087" y="2131904"/>
-            <a:ext cx="3434963" cy="2498935"/>
-          </a:xfrm>
-          <a:prstGeom prst="rect">
-            <a:avLst/>
-          </a:prstGeom>
-        </p:spPr>
-      </p:pic>
       <p:sp>
         <p:nvSpPr>
           <p:cNvPr id="17" name="Freeform 6">
@@ -13896,6 +14575,36 @@
           </a:p>
         </p:txBody>
       </p:sp>
+      <p:pic>
+        <p:nvPicPr>
+          <p:cNvPr id="5" name="Picture 4">
+            <a:extLst>
+              <a:ext uri="{FF2B5EF4-FFF2-40B4-BE49-F238E27FC236}">
+                <a16:creationId xmlns:a16="http://schemas.microsoft.com/office/drawing/2014/main" id="{4AE12418-1EBC-47D0-B2FE-5C148D3412C0}"/>
+              </a:ext>
+            </a:extLst>
+          </p:cNvPr>
+          <p:cNvPicPr>
+            <a:picLocks noChangeAspect="1"/>
+          </p:cNvPicPr>
+          <p:nvPr/>
+        </p:nvPicPr>
+        <p:blipFill>
+          <a:blip r:embed="rId2"/>
+          <a:stretch>
+            <a:fillRect/>
+          </a:stretch>
+        </p:blipFill>
+        <p:spPr>
+          <a:xfrm>
+            <a:off x="8294578" y="2214033"/>
+            <a:ext cx="2828925" cy="2667000"/>
+          </a:xfrm>
+          <a:prstGeom prst="rect">
+            <a:avLst/>
+          </a:prstGeom>
+        </p:spPr>
+      </p:pic>
     </p:spTree>
     <p:extLst>
       <p:ext uri="{BB962C8B-B14F-4D97-AF65-F5344CB8AC3E}">
@@ -14701,22 +15410,12 @@
 </file>
 
 <file path=customXml/item1.xml><?xml version="1.0" encoding="utf-8"?>
-<p:properties xmlns:p="http://schemas.microsoft.com/office/2006/metadata/properties" xmlns:xsi="http://www.w3.org/2001/XMLSchema-instance" xmlns:pc="http://schemas.microsoft.com/office/infopath/2007/PartnerControls">
-  <documentManagement>
-    <_ip_UnifiedCompliancePolicyUIAction xmlns="http://schemas.microsoft.com/sharepoint/v3" xsi:nil="true"/>
-    <Image xmlns="71af3243-3dd4-4a8d-8c0d-dd76da1f02a5">
-      <Url xsi:nil="true"/>
-      <Description xsi:nil="true"/>
-    </Image>
-    <Status xmlns="71af3243-3dd4-4a8d-8c0d-dd76da1f02a5">Not started</Status>
-    <_ip_UnifiedCompliancePolicyProperties xmlns="http://schemas.microsoft.com/sharepoint/v3" xsi:nil="true"/>
-    <ImageTagsTaxHTField xmlns="71af3243-3dd4-4a8d-8c0d-dd76da1f02a5">
-      <Terms xmlns="http://schemas.microsoft.com/office/infopath/2007/PartnerControls"/>
-    </ImageTagsTaxHTField>
-    <TaxCatchAll xmlns="230e9df3-be65-4c73-a93b-d1236ebd677e"/>
-    <MediaServiceKeyPoints xmlns="71af3243-3dd4-4a8d-8c0d-dd76da1f02a5" xsi:nil="true"/>
-  </documentManagement>
-</p:properties>
+<?mso-contentType ?>
+<FormTemplates xmlns="http://schemas.microsoft.com/sharepoint/v3/contenttype/forms">
+  <Display>DocumentLibraryForm</Display>
+  <Edit>DocumentLibraryForm</Edit>
+  <New>DocumentLibraryForm</New>
+</FormTemplates>
 </file>
 
 <file path=customXml/item2.xml><?xml version="1.0" encoding="utf-8"?>
@@ -14996,22 +15695,28 @@
 </file>
 
 <file path=customXml/item3.xml><?xml version="1.0" encoding="utf-8"?>
-<?mso-contentType ?>
-<FormTemplates xmlns="http://schemas.microsoft.com/sharepoint/v3/contenttype/forms">
-  <Display>DocumentLibraryForm</Display>
-  <Edit>DocumentLibraryForm</Edit>
-  <New>DocumentLibraryForm</New>
-</FormTemplates>
+<p:properties xmlns:p="http://schemas.microsoft.com/office/2006/metadata/properties" xmlns:xsi="http://www.w3.org/2001/XMLSchema-instance" xmlns:pc="http://schemas.microsoft.com/office/infopath/2007/PartnerControls">
+  <documentManagement>
+    <_ip_UnifiedCompliancePolicyUIAction xmlns="http://schemas.microsoft.com/sharepoint/v3" xsi:nil="true"/>
+    <Image xmlns="71af3243-3dd4-4a8d-8c0d-dd76da1f02a5">
+      <Url xsi:nil="true"/>
+      <Description xsi:nil="true"/>
+    </Image>
+    <Status xmlns="71af3243-3dd4-4a8d-8c0d-dd76da1f02a5">Not started</Status>
+    <_ip_UnifiedCompliancePolicyProperties xmlns="http://schemas.microsoft.com/sharepoint/v3" xsi:nil="true"/>
+    <ImageTagsTaxHTField xmlns="71af3243-3dd4-4a8d-8c0d-dd76da1f02a5">
+      <Terms xmlns="http://schemas.microsoft.com/office/infopath/2007/PartnerControls"/>
+    </ImageTagsTaxHTField>
+    <TaxCatchAll xmlns="230e9df3-be65-4c73-a93b-d1236ebd677e"/>
+    <MediaServiceKeyPoints xmlns="71af3243-3dd4-4a8d-8c0d-dd76da1f02a5" xsi:nil="true"/>
+  </documentManagement>
+</p:properties>
 </file>
 
 <file path=customXml/itemProps1.xml><?xml version="1.0" encoding="utf-8"?>
-<ds:datastoreItem xmlns:ds="http://schemas.openxmlformats.org/officeDocument/2006/customXml" ds:itemID="{79B0F2AC-8567-4D03-BFFC-653DB596C528}">
+<ds:datastoreItem xmlns:ds="http://schemas.openxmlformats.org/officeDocument/2006/customXml" ds:itemID="{350455F8-10A0-4EEF-9BB1-9035E295B165}">
   <ds:schemaRefs>
-    <ds:schemaRef ds:uri="230e9df3-be65-4c73-a93b-d1236ebd677e"/>
-    <ds:schemaRef ds:uri="71af3243-3dd4-4a8d-8c0d-dd76da1f02a5"/>
-    <ds:schemaRef ds:uri="http://schemas.microsoft.com/office/2006/metadata/properties"/>
-    <ds:schemaRef ds:uri="http://schemas.microsoft.com/office/infopath/2007/PartnerControls"/>
-    <ds:schemaRef ds:uri="http://schemas.microsoft.com/sharepoint/v3"/>
+    <ds:schemaRef ds:uri="http://schemas.microsoft.com/sharepoint/v3/contenttype/forms"/>
   </ds:schemaRefs>
 </ds:datastoreItem>
 </file>
@@ -15038,9 +15743,13 @@
 </file>
 
 <file path=customXml/itemProps3.xml><?xml version="1.0" encoding="utf-8"?>
-<ds:datastoreItem xmlns:ds="http://schemas.openxmlformats.org/officeDocument/2006/customXml" ds:itemID="{350455F8-10A0-4EEF-9BB1-9035E295B165}">
+<ds:datastoreItem xmlns:ds="http://schemas.openxmlformats.org/officeDocument/2006/customXml" ds:itemID="{79B0F2AC-8567-4D03-BFFC-653DB596C528}">
   <ds:schemaRefs>
-    <ds:schemaRef ds:uri="http://schemas.microsoft.com/sharepoint/v3/contenttype/forms"/>
+    <ds:schemaRef ds:uri="230e9df3-be65-4c73-a93b-d1236ebd677e"/>
+    <ds:schemaRef ds:uri="71af3243-3dd4-4a8d-8c0d-dd76da1f02a5"/>
+    <ds:schemaRef ds:uri="http://schemas.microsoft.com/office/2006/metadata/properties"/>
+    <ds:schemaRef ds:uri="http://schemas.microsoft.com/office/infopath/2007/PartnerControls"/>
+    <ds:schemaRef ds:uri="http://schemas.microsoft.com/sharepoint/v3"/>
   </ds:schemaRefs>
 </ds:datastoreItem>
 </file>
</xml_diff>